<commit_message>
update ppt and modify query
</commit_message>
<xml_diff>
--- a/doc/세종교육_AI프로젝트.pptx
+++ b/doc/세종교육_AI프로젝트.pptx
@@ -12,6 +12,9 @@
     <p:sldId id="259" r:id="rId6"/>
     <p:sldId id="262" r:id="rId7"/>
     <p:sldId id="263" r:id="rId8"/>
+    <p:sldId id="264" r:id="rId9"/>
+    <p:sldId id="265" r:id="rId10"/>
+    <p:sldId id="266" r:id="rId11"/>
   </p:sldIdLst>
   <p:sldSz cx="12192000" cy="6858000"/>
   <p:notesSz cx="6858000" cy="9144000"/>
@@ -343,7 +346,7 @@
             <a:fld id="{5586B75A-687E-405C-8A0B-8D00578BA2C3}" type="datetimeFigureOut">
               <a:rPr lang="en-US" dirty="0"/>
               <a:pPr/>
-              <a:t>12/6/2024</a:t>
+              <a:t>12/9/2024</a:t>
             </a:fld>
             <a:endParaRPr lang="en-US" dirty="0"/>
           </a:p>
@@ -510,7 +513,7 @@
             <a:fld id="{5586B75A-687E-405C-8A0B-8D00578BA2C3}" type="datetimeFigureOut">
               <a:rPr lang="en-US" dirty="0"/>
               <a:pPr/>
-              <a:t>12/6/2024</a:t>
+              <a:t>12/9/2024</a:t>
             </a:fld>
             <a:endParaRPr lang="en-US" dirty="0"/>
           </a:p>
@@ -687,7 +690,7 @@
             <a:fld id="{5586B75A-687E-405C-8A0B-8D00578BA2C3}" type="datetimeFigureOut">
               <a:rPr lang="en-US" dirty="0"/>
               <a:pPr/>
-              <a:t>12/6/2024</a:t>
+              <a:t>12/9/2024</a:t>
             </a:fld>
             <a:endParaRPr lang="en-US" dirty="0"/>
           </a:p>
@@ -854,7 +857,7 @@
             <a:fld id="{5586B75A-687E-405C-8A0B-8D00578BA2C3}" type="datetimeFigureOut">
               <a:rPr lang="en-US" dirty="0"/>
               <a:pPr/>
-              <a:t>12/6/2024</a:t>
+              <a:t>12/9/2024</a:t>
             </a:fld>
             <a:endParaRPr lang="en-US" dirty="0"/>
           </a:p>
@@ -1109,7 +1112,7 @@
             <a:fld id="{5586B75A-687E-405C-8A0B-8D00578BA2C3}" type="datetimeFigureOut">
               <a:rPr lang="en-US" dirty="0"/>
               <a:pPr/>
-              <a:t>12/6/2024</a:t>
+              <a:t>12/9/2024</a:t>
             </a:fld>
             <a:endParaRPr lang="en-US" dirty="0"/>
           </a:p>
@@ -1394,7 +1397,7 @@
             <a:fld id="{5586B75A-687E-405C-8A0B-8D00578BA2C3}" type="datetimeFigureOut">
               <a:rPr lang="en-US" dirty="0"/>
               <a:pPr/>
-              <a:t>12/6/2024</a:t>
+              <a:t>12/9/2024</a:t>
             </a:fld>
             <a:endParaRPr lang="en-US" dirty="0"/>
           </a:p>
@@ -1833,7 +1836,7 @@
             <a:fld id="{5586B75A-687E-405C-8A0B-8D00578BA2C3}" type="datetimeFigureOut">
               <a:rPr lang="en-US" dirty="0"/>
               <a:pPr/>
-              <a:t>12/6/2024</a:t>
+              <a:t>12/9/2024</a:t>
             </a:fld>
             <a:endParaRPr lang="en-US" dirty="0"/>
           </a:p>
@@ -1948,7 +1951,7 @@
             <a:fld id="{5586B75A-687E-405C-8A0B-8D00578BA2C3}" type="datetimeFigureOut">
               <a:rPr lang="en-US" dirty="0"/>
               <a:pPr/>
-              <a:t>12/6/2024</a:t>
+              <a:t>12/9/2024</a:t>
             </a:fld>
             <a:endParaRPr lang="en-US" dirty="0"/>
           </a:p>
@@ -2040,7 +2043,7 @@
             <a:fld id="{5586B75A-687E-405C-8A0B-8D00578BA2C3}" type="datetimeFigureOut">
               <a:rPr lang="en-US" dirty="0"/>
               <a:pPr/>
-              <a:t>12/6/2024</a:t>
+              <a:t>12/9/2024</a:t>
             </a:fld>
             <a:endParaRPr lang="en-US" dirty="0"/>
           </a:p>
@@ -2683,7 +2686,7 @@
             <a:fld id="{5586B75A-687E-405C-8A0B-8D00578BA2C3}" type="datetimeFigureOut">
               <a:rPr lang="en-US" dirty="0"/>
               <a:pPr/>
-              <a:t>12/6/2024</a:t>
+              <a:t>12/9/2024</a:t>
             </a:fld>
             <a:endParaRPr lang="en-US" dirty="0"/>
           </a:p>
@@ -2953,7 +2956,7 @@
             <a:fld id="{5586B75A-687E-405C-8A0B-8D00578BA2C3}" type="datetimeFigureOut">
               <a:rPr lang="en-US" dirty="0"/>
               <a:pPr/>
-              <a:t>12/6/2024</a:t>
+              <a:t>12/9/2024</a:t>
             </a:fld>
             <a:endParaRPr lang="en-US" dirty="0"/>
           </a:p>
@@ -3247,7 +3250,7 @@
             <a:fld id="{5586B75A-687E-405C-8A0B-8D00578BA2C3}" type="datetimeFigureOut">
               <a:rPr lang="en-US" dirty="0"/>
               <a:pPr/>
-              <a:t>12/6/2024</a:t>
+              <a:t>12/9/2024</a:t>
             </a:fld>
             <a:endParaRPr lang="en-US" dirty="0"/>
           </a:p>
@@ -3803,6 +3806,579 @@
 </p:sld>
 </file>
 
+<file path=ppt/slides/slide10.xml><?xml version="1.0" encoding="utf-8"?>
+<p:sld xmlns:a="http://schemas.openxmlformats.org/drawingml/2006/main" xmlns:r="http://schemas.openxmlformats.org/officeDocument/2006/relationships" xmlns:p="http://schemas.openxmlformats.org/presentationml/2006/main">
+  <p:cSld>
+    <p:spTree>
+      <p:nvGrpSpPr>
+        <p:cNvPr id="1" name=""/>
+        <p:cNvGrpSpPr/>
+        <p:nvPr/>
+      </p:nvGrpSpPr>
+      <p:grpSpPr>
+        <a:xfrm>
+          <a:off x="0" y="0"/>
+          <a:ext cx="0" cy="0"/>
+          <a:chOff x="0" y="0"/>
+          <a:chExt cx="0" cy="0"/>
+        </a:xfrm>
+      </p:grpSpPr>
+      <p:sp>
+        <p:nvSpPr>
+          <p:cNvPr id="2" name="TextBox 1"/>
+          <p:cNvSpPr txBox="1"/>
+          <p:nvPr/>
+        </p:nvSpPr>
+        <p:spPr>
+          <a:xfrm>
+            <a:off x="9127221" y="201336"/>
+            <a:ext cx="2509020" cy="584775"/>
+          </a:xfrm>
+          <a:prstGeom prst="rect">
+            <a:avLst/>
+          </a:prstGeom>
+          <a:noFill/>
+        </p:spPr>
+        <p:txBody>
+          <a:bodyPr wrap="none" rtlCol="0">
+            <a:spAutoFit/>
+          </a:bodyPr>
+          <a:lstStyle/>
+          <a:p>
+            <a:pPr algn="r"/>
+            <a:r>
+              <a:rPr lang="en-US" altLang="ko-KR" sz="3200" dirty="0" smtClean="0">
+                <a:solidFill>
+                  <a:schemeClr val="bg1"/>
+                </a:solidFill>
+              </a:rPr>
+              <a:t>DB </a:t>
+            </a:r>
+            <a:r>
+              <a:rPr lang="ko-KR" altLang="en-US" sz="3200" dirty="0" smtClean="0">
+                <a:solidFill>
+                  <a:schemeClr val="bg1"/>
+                </a:solidFill>
+              </a:rPr>
+              <a:t>서버 구축</a:t>
+            </a:r>
+            <a:endParaRPr lang="ko-KR" altLang="en-US" sz="3200" dirty="0">
+              <a:solidFill>
+                <a:schemeClr val="bg1"/>
+              </a:solidFill>
+            </a:endParaRPr>
+          </a:p>
+        </p:txBody>
+      </p:sp>
+      <p:sp>
+        <p:nvSpPr>
+          <p:cNvPr id="3" name="TextBox 2"/>
+          <p:cNvSpPr txBox="1"/>
+          <p:nvPr/>
+        </p:nvSpPr>
+        <p:spPr>
+          <a:xfrm>
+            <a:off x="4683211" y="2063578"/>
+            <a:ext cx="184731" cy="369332"/>
+          </a:xfrm>
+          <a:prstGeom prst="rect">
+            <a:avLst/>
+          </a:prstGeom>
+          <a:noFill/>
+        </p:spPr>
+        <p:txBody>
+          <a:bodyPr wrap="none" rtlCol="0">
+            <a:spAutoFit/>
+          </a:bodyPr>
+          <a:lstStyle/>
+          <a:p>
+            <a:endParaRPr lang="ko-KR" altLang="en-US" dirty="0"/>
+          </a:p>
+        </p:txBody>
+      </p:sp>
+      <p:sp>
+        <p:nvSpPr>
+          <p:cNvPr id="4" name="TextBox 3"/>
+          <p:cNvSpPr txBox="1"/>
+          <p:nvPr/>
+        </p:nvSpPr>
+        <p:spPr>
+          <a:xfrm>
+            <a:off x="4683211" y="1606378"/>
+            <a:ext cx="45719" cy="369332"/>
+          </a:xfrm>
+          <a:prstGeom prst="rect">
+            <a:avLst/>
+          </a:prstGeom>
+          <a:noFill/>
+        </p:spPr>
+        <p:txBody>
+          <a:bodyPr wrap="square" rtlCol="0">
+            <a:spAutoFit/>
+          </a:bodyPr>
+          <a:lstStyle/>
+          <a:p>
+            <a:endParaRPr lang="ko-KR" altLang="en-US" dirty="0"/>
+          </a:p>
+        </p:txBody>
+      </p:sp>
+      <p:sp>
+        <p:nvSpPr>
+          <p:cNvPr id="7" name="직사각형 6"/>
+          <p:cNvSpPr/>
+          <p:nvPr/>
+        </p:nvSpPr>
+        <p:spPr>
+          <a:xfrm>
+            <a:off x="2796670" y="1673598"/>
+            <a:ext cx="6096000" cy="3600986"/>
+          </a:xfrm>
+          <a:prstGeom prst="rect">
+            <a:avLst/>
+          </a:prstGeom>
+        </p:spPr>
+        <p:txBody>
+          <a:bodyPr>
+            <a:spAutoFit/>
+          </a:bodyPr>
+          <a:lstStyle/>
+          <a:p>
+            <a:r>
+              <a:rPr lang="ko-KR" altLang="en-US" sz="1200" dirty="0" err="1"/>
+              <a:t>mysql</a:t>
+            </a:r>
+            <a:r>
+              <a:rPr lang="ko-KR" altLang="en-US" sz="1200" dirty="0"/>
+              <a:t>&gt; DESCRIBE </a:t>
+            </a:r>
+            <a:r>
+              <a:rPr lang="ko-KR" altLang="en-US" sz="1200" dirty="0" err="1"/>
+              <a:t>posters</a:t>
+            </a:r>
+            <a:r>
+              <a:rPr lang="ko-KR" altLang="en-US" sz="1200" dirty="0"/>
+              <a:t>;</a:t>
+            </a:r>
+          </a:p>
+          <a:p>
+            <a:r>
+              <a:rPr lang="ko-KR" altLang="en-US" sz="1200" dirty="0"/>
+              <a:t>+----------+---------------+------+-----+---------+----------------+</a:t>
+            </a:r>
+          </a:p>
+          <a:p>
+            <a:r>
+              <a:rPr lang="ko-KR" altLang="en-US" sz="1200" dirty="0"/>
+              <a:t>| </a:t>
+            </a:r>
+            <a:r>
+              <a:rPr lang="ko-KR" altLang="en-US" sz="1200" dirty="0" err="1"/>
+              <a:t>Field</a:t>
+            </a:r>
+            <a:r>
+              <a:rPr lang="ko-KR" altLang="en-US" sz="1200" dirty="0"/>
+              <a:t>    | </a:t>
+            </a:r>
+            <a:r>
+              <a:rPr lang="ko-KR" altLang="en-US" sz="1200" dirty="0" err="1"/>
+              <a:t>Type</a:t>
+            </a:r>
+            <a:r>
+              <a:rPr lang="ko-KR" altLang="en-US" sz="1200" dirty="0"/>
+              <a:t>          | </a:t>
+            </a:r>
+            <a:r>
+              <a:rPr lang="ko-KR" altLang="en-US" sz="1200" dirty="0" err="1"/>
+              <a:t>Null</a:t>
+            </a:r>
+            <a:r>
+              <a:rPr lang="ko-KR" altLang="en-US" sz="1200" dirty="0"/>
+              <a:t> | </a:t>
+            </a:r>
+            <a:r>
+              <a:rPr lang="ko-KR" altLang="en-US" sz="1200" dirty="0" err="1"/>
+              <a:t>Key</a:t>
+            </a:r>
+            <a:r>
+              <a:rPr lang="ko-KR" altLang="en-US" sz="1200" dirty="0"/>
+              <a:t> | </a:t>
+            </a:r>
+            <a:r>
+              <a:rPr lang="ko-KR" altLang="en-US" sz="1200" dirty="0" err="1"/>
+              <a:t>Default</a:t>
+            </a:r>
+            <a:r>
+              <a:rPr lang="ko-KR" altLang="en-US" sz="1200" dirty="0"/>
+              <a:t> | </a:t>
+            </a:r>
+            <a:r>
+              <a:rPr lang="ko-KR" altLang="en-US" sz="1200" dirty="0" err="1"/>
+              <a:t>Extra</a:t>
+            </a:r>
+            <a:r>
+              <a:rPr lang="ko-KR" altLang="en-US" sz="1200" dirty="0"/>
+              <a:t>          |</a:t>
+            </a:r>
+          </a:p>
+          <a:p>
+            <a:r>
+              <a:rPr lang="ko-KR" altLang="en-US" sz="1200" dirty="0"/>
+              <a:t>+----------+---------------+------+-----+---------+----------------+</a:t>
+            </a:r>
+          </a:p>
+          <a:p>
+            <a:r>
+              <a:rPr lang="ko-KR" altLang="en-US" sz="1200" dirty="0"/>
+              <a:t>| </a:t>
+            </a:r>
+            <a:r>
+              <a:rPr lang="ko-KR" altLang="en-US" sz="1200" dirty="0" err="1"/>
+              <a:t>id</a:t>
+            </a:r>
+            <a:r>
+              <a:rPr lang="ko-KR" altLang="en-US" sz="1200" dirty="0"/>
+              <a:t>       | </a:t>
+            </a:r>
+            <a:r>
+              <a:rPr lang="ko-KR" altLang="en-US" sz="1200" dirty="0" err="1"/>
+              <a:t>int</a:t>
+            </a:r>
+            <a:r>
+              <a:rPr lang="ko-KR" altLang="en-US" sz="1200" dirty="0"/>
+              <a:t>           | NO   | PRI | NULL    | </a:t>
+            </a:r>
+            <a:r>
+              <a:rPr lang="ko-KR" altLang="en-US" sz="1200" dirty="0" err="1"/>
+              <a:t>auto_increment</a:t>
+            </a:r>
+            <a:r>
+              <a:rPr lang="ko-KR" altLang="en-US" sz="1200" dirty="0"/>
+              <a:t> |</a:t>
+            </a:r>
+          </a:p>
+          <a:p>
+            <a:r>
+              <a:rPr lang="ko-KR" altLang="en-US" sz="1200" dirty="0"/>
+              <a:t>| </a:t>
+            </a:r>
+            <a:r>
+              <a:rPr lang="ko-KR" altLang="en-US" sz="1200" dirty="0" err="1"/>
+              <a:t>image</a:t>
+            </a:r>
+            <a:r>
+              <a:rPr lang="ko-KR" altLang="en-US" sz="1200" dirty="0"/>
+              <a:t>    | </a:t>
+            </a:r>
+            <a:r>
+              <a:rPr lang="ko-KR" altLang="en-US" sz="1200" dirty="0" err="1"/>
+              <a:t>longblob</a:t>
+            </a:r>
+            <a:r>
+              <a:rPr lang="ko-KR" altLang="en-US" sz="1200" dirty="0"/>
+              <a:t>      | NO   |     | NULL    |                |</a:t>
+            </a:r>
+          </a:p>
+          <a:p>
+            <a:r>
+              <a:rPr lang="ko-KR" altLang="en-US" sz="1200" dirty="0"/>
+              <a:t>| </a:t>
+            </a:r>
+            <a:r>
+              <a:rPr lang="ko-KR" altLang="en-US" sz="1200" dirty="0" err="1"/>
+              <a:t>title</a:t>
+            </a:r>
+            <a:r>
+              <a:rPr lang="ko-KR" altLang="en-US" sz="1200" dirty="0"/>
+              <a:t>    | </a:t>
+            </a:r>
+            <a:r>
+              <a:rPr lang="ko-KR" altLang="en-US" sz="1200" dirty="0" err="1"/>
+              <a:t>varchar</a:t>
+            </a:r>
+            <a:r>
+              <a:rPr lang="ko-KR" altLang="en-US" sz="1200" dirty="0"/>
+              <a:t>(255)  | NO   |     | NULL    |                |</a:t>
+            </a:r>
+          </a:p>
+          <a:p>
+            <a:r>
+              <a:rPr lang="ko-KR" altLang="en-US" sz="1200" dirty="0"/>
+              <a:t>| </a:t>
+            </a:r>
+            <a:r>
+              <a:rPr lang="ko-KR" altLang="en-US" sz="1200" dirty="0" err="1"/>
+              <a:t>relYear</a:t>
+            </a:r>
+            <a:r>
+              <a:rPr lang="ko-KR" altLang="en-US" sz="1200" dirty="0"/>
+              <a:t>  | </a:t>
+            </a:r>
+            <a:r>
+              <a:rPr lang="ko-KR" altLang="en-US" sz="1200" dirty="0" err="1"/>
+              <a:t>int</a:t>
+            </a:r>
+            <a:r>
+              <a:rPr lang="ko-KR" altLang="en-US" sz="1200" dirty="0"/>
+              <a:t>           | NO   |     | NULL    |                |</a:t>
+            </a:r>
+          </a:p>
+          <a:p>
+            <a:r>
+              <a:rPr lang="ko-KR" altLang="en-US" sz="1200" dirty="0"/>
+              <a:t>| </a:t>
+            </a:r>
+            <a:r>
+              <a:rPr lang="ko-KR" altLang="en-US" sz="1200" dirty="0" err="1"/>
+              <a:t>rating</a:t>
+            </a:r>
+            <a:r>
+              <a:rPr lang="ko-KR" altLang="en-US" sz="1200" dirty="0"/>
+              <a:t>   | </a:t>
+            </a:r>
+            <a:r>
+              <a:rPr lang="ko-KR" altLang="en-US" sz="1200" dirty="0" err="1"/>
+              <a:t>varchar</a:t>
+            </a:r>
+            <a:r>
+              <a:rPr lang="ko-KR" altLang="en-US" sz="1200" dirty="0"/>
+              <a:t>(20)   | NO   |     | NULL    |                |</a:t>
+            </a:r>
+          </a:p>
+          <a:p>
+            <a:r>
+              <a:rPr lang="ko-KR" altLang="en-US" sz="1200" dirty="0"/>
+              <a:t>| </a:t>
+            </a:r>
+            <a:r>
+              <a:rPr lang="ko-KR" altLang="en-US" sz="1200" dirty="0" err="1"/>
+              <a:t>runTime</a:t>
+            </a:r>
+            <a:r>
+              <a:rPr lang="ko-KR" altLang="en-US" sz="1200" dirty="0"/>
+              <a:t>  | </a:t>
+            </a:r>
+            <a:r>
+              <a:rPr lang="ko-KR" altLang="en-US" sz="1200" dirty="0" err="1"/>
+              <a:t>float</a:t>
+            </a:r>
+            <a:r>
+              <a:rPr lang="ko-KR" altLang="en-US" sz="1200" dirty="0"/>
+              <a:t>         | NO   |     | NULL    |                |</a:t>
+            </a:r>
+          </a:p>
+          <a:p>
+            <a:r>
+              <a:rPr lang="ko-KR" altLang="en-US" sz="1200" dirty="0"/>
+              <a:t>| </a:t>
+            </a:r>
+            <a:r>
+              <a:rPr lang="ko-KR" altLang="en-US" sz="1200" dirty="0" err="1"/>
+              <a:t>genre</a:t>
+            </a:r>
+            <a:r>
+              <a:rPr lang="ko-KR" altLang="en-US" sz="1200" dirty="0"/>
+              <a:t>    | </a:t>
+            </a:r>
+            <a:r>
+              <a:rPr lang="ko-KR" altLang="en-US" sz="1200" dirty="0" err="1"/>
+              <a:t>varchar</a:t>
+            </a:r>
+            <a:r>
+              <a:rPr lang="ko-KR" altLang="en-US" sz="1200" dirty="0"/>
+              <a:t>(255)  | NO   |     | NULL    |                |</a:t>
+            </a:r>
+          </a:p>
+          <a:p>
+            <a:r>
+              <a:rPr lang="ko-KR" altLang="en-US" sz="1200" dirty="0"/>
+              <a:t>| </a:t>
+            </a:r>
+            <a:r>
+              <a:rPr lang="ko-KR" altLang="en-US" sz="1200" dirty="0" err="1"/>
+              <a:t>director</a:t>
+            </a:r>
+            <a:r>
+              <a:rPr lang="ko-KR" altLang="en-US" sz="1200" dirty="0"/>
+              <a:t> | </a:t>
+            </a:r>
+            <a:r>
+              <a:rPr lang="ko-KR" altLang="en-US" sz="1200" dirty="0" err="1"/>
+              <a:t>varchar</a:t>
+            </a:r>
+            <a:r>
+              <a:rPr lang="ko-KR" altLang="en-US" sz="1200" dirty="0"/>
+              <a:t>(255)  | NO   |     | NULL    |                |</a:t>
+            </a:r>
+          </a:p>
+          <a:p>
+            <a:r>
+              <a:rPr lang="ko-KR" altLang="en-US" sz="1200" dirty="0"/>
+              <a:t>| </a:t>
+            </a:r>
+            <a:r>
+              <a:rPr lang="ko-KR" altLang="en-US" sz="1200" dirty="0" err="1"/>
+              <a:t>actor</a:t>
+            </a:r>
+            <a:r>
+              <a:rPr lang="ko-KR" altLang="en-US" sz="1200" dirty="0"/>
+              <a:t>    | </a:t>
+            </a:r>
+            <a:r>
+              <a:rPr lang="ko-KR" altLang="en-US" sz="1200" dirty="0" err="1"/>
+              <a:t>varchar</a:t>
+            </a:r>
+            <a:r>
+              <a:rPr lang="ko-KR" altLang="en-US" sz="1200" dirty="0"/>
+              <a:t>(255)  | NO   |     | NULL    |                |</a:t>
+            </a:r>
+          </a:p>
+          <a:p>
+            <a:r>
+              <a:rPr lang="ko-KR" altLang="en-US" sz="1200" dirty="0"/>
+              <a:t>| </a:t>
+            </a:r>
+            <a:r>
+              <a:rPr lang="ko-KR" altLang="en-US" sz="1200" dirty="0" err="1"/>
+              <a:t>story</a:t>
+            </a:r>
+            <a:r>
+              <a:rPr lang="ko-KR" altLang="en-US" sz="1200" dirty="0"/>
+              <a:t>    | </a:t>
+            </a:r>
+            <a:r>
+              <a:rPr lang="ko-KR" altLang="en-US" sz="1200" dirty="0" err="1"/>
+              <a:t>varchar</a:t>
+            </a:r>
+            <a:r>
+              <a:rPr lang="ko-KR" altLang="en-US" sz="1200" dirty="0"/>
+              <a:t>(2000) | NO   |     | NULL    |                |</a:t>
+            </a:r>
+          </a:p>
+          <a:p>
+            <a:r>
+              <a:rPr lang="ko-KR" altLang="en-US" sz="1200" dirty="0"/>
+              <a:t>| </a:t>
+            </a:r>
+            <a:r>
+              <a:rPr lang="ko-KR" altLang="en-US" sz="1200" dirty="0" err="1"/>
+              <a:t>prod</a:t>
+            </a:r>
+            <a:r>
+              <a:rPr lang="ko-KR" altLang="en-US" sz="1200" dirty="0"/>
+              <a:t>     | </a:t>
+            </a:r>
+            <a:r>
+              <a:rPr lang="ko-KR" altLang="en-US" sz="1200" dirty="0" err="1"/>
+              <a:t>varchar</a:t>
+            </a:r>
+            <a:r>
+              <a:rPr lang="ko-KR" altLang="en-US" sz="1200" dirty="0"/>
+              <a:t>(255)  | NO   |     | NULL    |                |</a:t>
+            </a:r>
+          </a:p>
+          <a:p>
+            <a:r>
+              <a:rPr lang="ko-KR" altLang="en-US" sz="1200" dirty="0"/>
+              <a:t>| </a:t>
+            </a:r>
+            <a:r>
+              <a:rPr lang="ko-KR" altLang="en-US" sz="1200" dirty="0" err="1"/>
+              <a:t>nation</a:t>
+            </a:r>
+            <a:r>
+              <a:rPr lang="ko-KR" altLang="en-US" sz="1200" dirty="0"/>
+              <a:t>   | </a:t>
+            </a:r>
+            <a:r>
+              <a:rPr lang="ko-KR" altLang="en-US" sz="1200" dirty="0" err="1"/>
+              <a:t>varchar</a:t>
+            </a:r>
+            <a:r>
+              <a:rPr lang="ko-KR" altLang="en-US" sz="1200" dirty="0"/>
+              <a:t>(255)  | NO   |     | NULL    |                |</a:t>
+            </a:r>
+          </a:p>
+          <a:p>
+            <a:r>
+              <a:rPr lang="ko-KR" altLang="en-US" sz="1200" dirty="0"/>
+              <a:t>| </a:t>
+            </a:r>
+            <a:r>
+              <a:rPr lang="ko-KR" altLang="en-US" sz="1200" dirty="0" err="1"/>
+              <a:t>etc</a:t>
+            </a:r>
+            <a:r>
+              <a:rPr lang="ko-KR" altLang="en-US" sz="1200" dirty="0"/>
+              <a:t>      | </a:t>
+            </a:r>
+            <a:r>
+              <a:rPr lang="ko-KR" altLang="en-US" sz="1200" dirty="0" err="1"/>
+              <a:t>varchar</a:t>
+            </a:r>
+            <a:r>
+              <a:rPr lang="ko-KR" altLang="en-US" sz="1200" dirty="0"/>
+              <a:t>(255)  | YES  |     | NULL    |                |</a:t>
+            </a:r>
+          </a:p>
+          <a:p>
+            <a:r>
+              <a:rPr lang="ko-KR" altLang="en-US" sz="1200" dirty="0"/>
+              <a:t>+----------+---------------+------+-----+---------+----------------+</a:t>
+            </a:r>
+          </a:p>
+          <a:p>
+            <a:r>
+              <a:rPr lang="ko-KR" altLang="en-US" sz="1200" dirty="0"/>
+              <a:t>13 </a:t>
+            </a:r>
+            <a:r>
+              <a:rPr lang="ko-KR" altLang="en-US" sz="1200" dirty="0" err="1"/>
+              <a:t>rows</a:t>
+            </a:r>
+            <a:r>
+              <a:rPr lang="ko-KR" altLang="en-US" sz="1200" dirty="0"/>
+              <a:t> </a:t>
+            </a:r>
+            <a:r>
+              <a:rPr lang="ko-KR" altLang="en-US" sz="1200" dirty="0" err="1"/>
+              <a:t>in</a:t>
+            </a:r>
+            <a:r>
+              <a:rPr lang="ko-KR" altLang="en-US" sz="1200" dirty="0"/>
+              <a:t> </a:t>
+            </a:r>
+            <a:r>
+              <a:rPr lang="ko-KR" altLang="en-US" sz="1200" dirty="0" err="1"/>
+              <a:t>set</a:t>
+            </a:r>
+            <a:r>
+              <a:rPr lang="ko-KR" altLang="en-US" sz="1200" dirty="0"/>
+              <a:t> (0.00 </a:t>
+            </a:r>
+            <a:r>
+              <a:rPr lang="ko-KR" altLang="en-US" sz="1200" dirty="0" err="1"/>
+              <a:t>sec</a:t>
+            </a:r>
+            <a:r>
+              <a:rPr lang="ko-KR" altLang="en-US" sz="1200" dirty="0"/>
+              <a:t>)</a:t>
+            </a:r>
+          </a:p>
+        </p:txBody>
+      </p:sp>
+    </p:spTree>
+    <p:extLst>
+      <p:ext uri="{BB962C8B-B14F-4D97-AF65-F5344CB8AC3E}">
+        <p14:creationId xmlns:p14="http://schemas.microsoft.com/office/powerpoint/2010/main" val="2691934056"/>
+      </p:ext>
+    </p:extLst>
+  </p:cSld>
+  <p:clrMapOvr>
+    <a:masterClrMapping/>
+  </p:clrMapOvr>
+</p:sld>
+</file>
+
 <file path=ppt/slides/slide2.xml><?xml version="1.0" encoding="utf-8"?>
 <p:sld xmlns:a="http://schemas.openxmlformats.org/drawingml/2006/main" xmlns:r="http://schemas.openxmlformats.org/officeDocument/2006/relationships" xmlns:p="http://schemas.openxmlformats.org/presentationml/2006/main">
   <p:cSld>
@@ -4775,8 +5351,8 @@
         </p:nvSpPr>
         <p:spPr>
           <a:xfrm>
-            <a:off x="882787" y="1140903"/>
-            <a:ext cx="10501073" cy="4790114"/>
+            <a:off x="845464" y="1090569"/>
+            <a:ext cx="10501073" cy="4832058"/>
           </a:xfrm>
           <a:prstGeom prst="rect">
             <a:avLst/>
@@ -4788,7 +5364,7 @@
         </p:spPr>
         <p:txBody>
           <a:bodyPr numCol="3" spcCol="324000">
-            <a:normAutofit fontScale="92500" lnSpcReduction="20000"/>
+            <a:noAutofit/>
           </a:bodyPr>
           <a:lstStyle>
             <a:lvl1pPr marL="182880" indent="-182880" algn="l" defTabSz="914400" rtl="0" eaLnBrk="1" latinLnBrk="1" hangingPunct="1">
@@ -5034,135 +5610,195 @@
           </a:lstStyle>
           <a:p>
             <a:r>
-              <a:rPr lang="ko-KR" altLang="en-US" sz="1400" dirty="0" smtClean="0"/>
+              <a:rPr lang="ko-KR" altLang="en-US" sz="1200" dirty="0" smtClean="0">
+                <a:latin typeface="+mn-ea"/>
+              </a:rPr>
               <a:t>운영 체제</a:t>
             </a:r>
-            <a:endParaRPr lang="en-US" altLang="ko-KR" sz="1400" dirty="0" smtClean="0"/>
+            <a:endParaRPr lang="en-US" altLang="ko-KR" sz="1200" dirty="0" smtClean="0">
+              <a:latin typeface="+mn-ea"/>
+            </a:endParaRPr>
           </a:p>
           <a:p>
             <a:pPr marL="0" indent="0">
               <a:buNone/>
             </a:pPr>
             <a:r>
-              <a:rPr lang="en-US" altLang="ko-KR" sz="1400" dirty="0" smtClean="0"/>
+              <a:rPr lang="en-US" altLang="ko-KR" sz="1200" dirty="0" smtClean="0">
+                <a:latin typeface="+mn-ea"/>
+              </a:rPr>
               <a:t>-Windows 11 Pro (64-bit, build 22631)</a:t>
             </a:r>
           </a:p>
           <a:p>
-            <a:endParaRPr lang="en-US" altLang="ko-KR" sz="1400" dirty="0"/>
-          </a:p>
-          <a:p>
-            <a:r>
-              <a:rPr lang="ko-KR" altLang="en-US" sz="1400" dirty="0" smtClean="0"/>
+            <a:endParaRPr lang="en-US" altLang="ko-KR" sz="1200" dirty="0">
+              <a:latin typeface="+mn-ea"/>
+            </a:endParaRPr>
+          </a:p>
+          <a:p>
+            <a:r>
+              <a:rPr lang="ko-KR" altLang="en-US" sz="1200" dirty="0" smtClean="0">
+                <a:latin typeface="+mn-ea"/>
+              </a:rPr>
               <a:t>하드웨어 사</a:t>
             </a:r>
             <a:r>
-              <a:rPr lang="ko-KR" altLang="en-US" sz="1400" dirty="0"/>
+              <a:rPr lang="ko-KR" altLang="en-US" sz="1200" dirty="0">
+                <a:latin typeface="+mn-ea"/>
+              </a:rPr>
               <a:t>양</a:t>
             </a:r>
-            <a:endParaRPr lang="en-US" altLang="ko-KR" sz="1400" dirty="0"/>
+            <a:endParaRPr lang="en-US" altLang="ko-KR" sz="1200" dirty="0">
+              <a:latin typeface="+mn-ea"/>
+            </a:endParaRPr>
           </a:p>
           <a:p>
             <a:pPr marL="0" indent="0">
               <a:buNone/>
             </a:pPr>
             <a:r>
-              <a:rPr lang="en-US" altLang="ko-KR" sz="1400" dirty="0" smtClean="0"/>
+              <a:rPr lang="en-US" altLang="ko-KR" sz="1200" dirty="0" smtClean="0">
+                <a:latin typeface="+mn-ea"/>
+              </a:rPr>
               <a:t>-CPU: </a:t>
             </a:r>
             <a:r>
-              <a:rPr lang="ko-KR" altLang="en-US" sz="1400" dirty="0"/>
+              <a:rPr lang="ko-KR" altLang="en-US" sz="1200" dirty="0">
+                <a:latin typeface="+mn-ea"/>
+              </a:rPr>
               <a:t>11th </a:t>
             </a:r>
             <a:r>
-              <a:rPr lang="ko-KR" altLang="en-US" sz="1400" dirty="0" err="1"/>
+              <a:rPr lang="ko-KR" altLang="en-US" sz="1200" dirty="0" err="1">
+                <a:latin typeface="+mn-ea"/>
+              </a:rPr>
               <a:t>Gen</a:t>
             </a:r>
             <a:r>
-              <a:rPr lang="ko-KR" altLang="en-US" sz="1400" dirty="0"/>
+              <a:rPr lang="ko-KR" altLang="en-US" sz="1200" dirty="0">
+                <a:latin typeface="+mn-ea"/>
+              </a:rPr>
               <a:t> Intel(</a:t>
             </a:r>
             <a:r>
-              <a:rPr lang="ko-KR" altLang="en-US" sz="1400" dirty="0" err="1"/>
+              <a:rPr lang="ko-KR" altLang="en-US" sz="1200" dirty="0" err="1">
+                <a:latin typeface="+mn-ea"/>
+              </a:rPr>
               <a:t>R</a:t>
             </a:r>
             <a:r>
-              <a:rPr lang="ko-KR" altLang="en-US" sz="1400" dirty="0"/>
+              <a:rPr lang="ko-KR" altLang="en-US" sz="1200" dirty="0">
+                <a:latin typeface="+mn-ea"/>
+              </a:rPr>
               <a:t>) </a:t>
             </a:r>
             <a:r>
-              <a:rPr lang="ko-KR" altLang="en-US" sz="1400" dirty="0" err="1"/>
+              <a:rPr lang="ko-KR" altLang="en-US" sz="1200" dirty="0" err="1">
+                <a:latin typeface="+mn-ea"/>
+              </a:rPr>
               <a:t>Core</a:t>
             </a:r>
             <a:r>
-              <a:rPr lang="ko-KR" altLang="en-US" sz="1400" dirty="0"/>
+              <a:rPr lang="ko-KR" altLang="en-US" sz="1200" dirty="0">
+                <a:latin typeface="+mn-ea"/>
+              </a:rPr>
               <a:t>(TM) i7-11700F @ 2.50GHz   2.50 </a:t>
             </a:r>
             <a:r>
-              <a:rPr lang="ko-KR" altLang="en-US" sz="1400" dirty="0" err="1" smtClean="0"/>
+              <a:rPr lang="ko-KR" altLang="en-US" sz="1200" dirty="0" err="1" smtClean="0">
+                <a:latin typeface="+mn-ea"/>
+              </a:rPr>
               <a:t>GHz</a:t>
             </a:r>
-            <a:endParaRPr lang="en-US" altLang="ko-KR" sz="1400" dirty="0"/>
+            <a:endParaRPr lang="en-US" altLang="ko-KR" sz="1200" dirty="0">
+              <a:latin typeface="+mn-ea"/>
+            </a:endParaRPr>
           </a:p>
           <a:p>
             <a:pPr marL="0" indent="0">
               <a:buNone/>
             </a:pPr>
             <a:r>
-              <a:rPr lang="en-US" altLang="ko-KR" sz="1400" dirty="0" smtClean="0"/>
+              <a:rPr lang="en-US" altLang="ko-KR" sz="1200" dirty="0" smtClean="0">
+                <a:latin typeface="+mn-ea"/>
+              </a:rPr>
               <a:t>-RAM: </a:t>
             </a:r>
             <a:r>
-              <a:rPr lang="ko-KR" altLang="en-US" sz="1400" dirty="0" smtClean="0"/>
+              <a:rPr lang="ko-KR" altLang="en-US" sz="1200" dirty="0" smtClean="0">
+                <a:latin typeface="+mn-ea"/>
+              </a:rPr>
               <a:t>16.0GB</a:t>
             </a:r>
-            <a:endParaRPr lang="en-US" altLang="ko-KR" sz="1400" dirty="0"/>
+            <a:endParaRPr lang="en-US" altLang="ko-KR" sz="1200" dirty="0">
+              <a:latin typeface="+mn-ea"/>
+            </a:endParaRPr>
           </a:p>
           <a:p>
             <a:pPr marL="0" indent="0">
               <a:buNone/>
             </a:pPr>
             <a:r>
-              <a:rPr lang="en-US" altLang="ko-KR" sz="1400" dirty="0" smtClean="0"/>
+              <a:rPr lang="en-US" altLang="ko-KR" sz="1200" dirty="0" smtClean="0">
+                <a:latin typeface="+mn-ea"/>
+              </a:rPr>
               <a:t>-GPU</a:t>
             </a:r>
             <a:r>
-              <a:rPr lang="en-US" altLang="ko-KR" sz="1400" dirty="0"/>
+              <a:rPr lang="en-US" altLang="ko-KR" sz="1200" dirty="0">
+                <a:latin typeface="+mn-ea"/>
+              </a:rPr>
               <a:t>: NVIDIA GeForce RTX </a:t>
             </a:r>
             <a:r>
-              <a:rPr lang="en-US" altLang="ko-KR" sz="1400" dirty="0" smtClean="0"/>
+              <a:rPr lang="en-US" altLang="ko-KR" sz="1200" dirty="0" smtClean="0">
+                <a:latin typeface="+mn-ea"/>
+              </a:rPr>
               <a:t>306</a:t>
             </a:r>
           </a:p>
           <a:p>
-            <a:endParaRPr lang="en-US" altLang="ko-KR" sz="1400" dirty="0" smtClean="0"/>
-          </a:p>
-          <a:p>
-            <a:r>
-              <a:rPr lang="ko-KR" altLang="en-US" sz="1400" dirty="0" smtClean="0"/>
+            <a:endParaRPr lang="en-US" altLang="ko-KR" sz="1200" dirty="0" smtClean="0">
+              <a:latin typeface="+mn-ea"/>
+            </a:endParaRPr>
+          </a:p>
+          <a:p>
+            <a:r>
+              <a:rPr lang="ko-KR" altLang="en-US" sz="1200" dirty="0" smtClean="0">
+                <a:latin typeface="+mn-ea"/>
+              </a:rPr>
               <a:t>소프트웨어 및 도구</a:t>
             </a:r>
-            <a:endParaRPr lang="en-US" altLang="ko-KR" sz="1400" dirty="0" smtClean="0"/>
+            <a:endParaRPr lang="en-US" altLang="ko-KR" sz="1200" dirty="0" smtClean="0">
+              <a:latin typeface="+mn-ea"/>
+            </a:endParaRPr>
           </a:p>
           <a:p>
             <a:pPr marL="0" indent="0">
               <a:buNone/>
             </a:pPr>
             <a:r>
-              <a:rPr lang="en-US" altLang="ko-KR" sz="1400" dirty="0" smtClean="0"/>
+              <a:rPr lang="en-US" altLang="ko-KR" sz="1200" dirty="0" smtClean="0">
+                <a:latin typeface="+mn-ea"/>
+              </a:rPr>
               <a:t>-</a:t>
             </a:r>
             <a:r>
-              <a:rPr lang="ko-KR" altLang="en-US" sz="1400" dirty="0" smtClean="0"/>
+              <a:rPr lang="ko-KR" altLang="en-US" sz="1200" dirty="0" smtClean="0">
+                <a:latin typeface="+mn-ea"/>
+              </a:rPr>
               <a:t>프로그래밍 </a:t>
             </a:r>
             <a:r>
-              <a:rPr lang="ko-KR" altLang="en-US" sz="1400" dirty="0"/>
+              <a:rPr lang="ko-KR" altLang="en-US" sz="1200" dirty="0">
+                <a:latin typeface="+mn-ea"/>
+              </a:rPr>
               <a:t>언어</a:t>
             </a:r>
             <a:r>
-              <a:rPr lang="en-US" altLang="ko-KR" sz="1400" dirty="0"/>
+              <a:rPr lang="en-US" altLang="ko-KR" sz="1200" dirty="0">
+                <a:latin typeface="+mn-ea"/>
+              </a:rPr>
               <a:t>: Python, Java</a:t>
             </a:r>
           </a:p>
@@ -5171,15 +5807,21 @@
               <a:buNone/>
             </a:pPr>
             <a:r>
-              <a:rPr lang="en-US" altLang="ko-KR" sz="1400" dirty="0" smtClean="0"/>
+              <a:rPr lang="en-US" altLang="ko-KR" sz="1200" dirty="0" smtClean="0">
+                <a:latin typeface="+mn-ea"/>
+              </a:rPr>
               <a:t>-</a:t>
             </a:r>
             <a:r>
-              <a:rPr lang="ko-KR" altLang="en-US" sz="1400" dirty="0" smtClean="0"/>
+              <a:rPr lang="ko-KR" altLang="en-US" sz="1200" dirty="0" smtClean="0">
+                <a:latin typeface="+mn-ea"/>
+              </a:rPr>
               <a:t>편집기</a:t>
             </a:r>
             <a:r>
-              <a:rPr lang="en-US" altLang="ko-KR" sz="1400" dirty="0"/>
+              <a:rPr lang="en-US" altLang="ko-KR" sz="1200" dirty="0">
+                <a:latin typeface="+mn-ea"/>
+              </a:rPr>
               <a:t>: Visual Studio Code</a:t>
             </a:r>
           </a:p>
@@ -5188,45 +5830,65 @@
               <a:buNone/>
             </a:pPr>
             <a:r>
-              <a:rPr lang="en-US" altLang="ko-KR" sz="1400" dirty="0" smtClean="0"/>
+              <a:rPr lang="en-US" altLang="ko-KR" sz="1200" dirty="0" smtClean="0">
+                <a:latin typeface="+mn-ea"/>
+              </a:rPr>
               <a:t>-</a:t>
             </a:r>
             <a:r>
-              <a:rPr lang="ko-KR" altLang="en-US" sz="1400" dirty="0" smtClean="0"/>
+              <a:rPr lang="ko-KR" altLang="en-US" sz="1200" dirty="0" smtClean="0">
+                <a:latin typeface="+mn-ea"/>
+              </a:rPr>
               <a:t>빌드 </a:t>
             </a:r>
             <a:r>
-              <a:rPr lang="ko-KR" altLang="en-US" sz="1400" dirty="0"/>
+              <a:rPr lang="ko-KR" altLang="en-US" sz="1200" dirty="0">
+                <a:latin typeface="+mn-ea"/>
+              </a:rPr>
               <a:t>도구</a:t>
             </a:r>
             <a:r>
-              <a:rPr lang="en-US" altLang="ko-KR" sz="1400" dirty="0"/>
+              <a:rPr lang="en-US" altLang="ko-KR" sz="1200" dirty="0">
+                <a:latin typeface="+mn-ea"/>
+              </a:rPr>
               <a:t>: </a:t>
             </a:r>
             <a:r>
-              <a:rPr lang="en-US" altLang="ko-KR" sz="1400" dirty="0" err="1"/>
+              <a:rPr lang="en-US" altLang="ko-KR" sz="1200" dirty="0" err="1">
+                <a:latin typeface="+mn-ea"/>
+              </a:rPr>
               <a:t>Gradle</a:t>
             </a:r>
-            <a:endParaRPr lang="en-US" altLang="ko-KR" sz="1400" dirty="0"/>
+            <a:endParaRPr lang="en-US" altLang="ko-KR" sz="1200" dirty="0">
+              <a:latin typeface="+mn-ea"/>
+            </a:endParaRPr>
           </a:p>
           <a:p>
             <a:pPr marL="0" indent="0">
               <a:buNone/>
             </a:pPr>
             <a:r>
-              <a:rPr lang="en-US" altLang="ko-KR" sz="1400" dirty="0" smtClean="0"/>
+              <a:rPr lang="en-US" altLang="ko-KR" sz="1200" dirty="0" smtClean="0">
+                <a:latin typeface="+mn-ea"/>
+              </a:rPr>
               <a:t>-</a:t>
             </a:r>
             <a:r>
-              <a:rPr lang="ko-KR" altLang="en-US" sz="1400" dirty="0" smtClean="0"/>
+              <a:rPr lang="ko-KR" altLang="en-US" sz="1200" dirty="0" smtClean="0">
+                <a:latin typeface="+mn-ea"/>
+              </a:rPr>
               <a:t>버전 </a:t>
             </a:r>
             <a:r>
-              <a:rPr lang="ko-KR" altLang="en-US" sz="1400" dirty="0"/>
+              <a:rPr lang="ko-KR" altLang="en-US" sz="1200" dirty="0">
+                <a:latin typeface="+mn-ea"/>
+              </a:rPr>
               <a:t>관리</a:t>
             </a:r>
             <a:r>
-              <a:rPr lang="en-US" altLang="ko-KR" sz="1400" dirty="0"/>
+              <a:rPr lang="en-US" altLang="ko-KR" sz="1200" dirty="0">
+                <a:latin typeface="+mn-ea"/>
+              </a:rPr>
               <a:t>: GitHub</a:t>
             </a:r>
           </a:p>
@@ -5235,68 +5897,122 @@
               <a:buNone/>
             </a:pPr>
             <a:r>
-              <a:rPr lang="en-US" altLang="ko-KR" sz="1400" dirty="0" smtClean="0"/>
+              <a:rPr lang="en-US" altLang="ko-KR" sz="1200" dirty="0" smtClean="0">
+                <a:latin typeface="+mn-ea"/>
+              </a:rPr>
               <a:t>-</a:t>
             </a:r>
             <a:r>
-              <a:rPr lang="ko-KR" altLang="en-US" sz="1400" dirty="0" smtClean="0"/>
+              <a:rPr lang="ko-KR" altLang="en-US" sz="1200" dirty="0" smtClean="0">
+                <a:latin typeface="+mn-ea"/>
+              </a:rPr>
               <a:t>패키지 </a:t>
             </a:r>
             <a:r>
-              <a:rPr lang="ko-KR" altLang="en-US" sz="1400" dirty="0"/>
+              <a:rPr lang="ko-KR" altLang="en-US" sz="1200" dirty="0">
+                <a:latin typeface="+mn-ea"/>
+              </a:rPr>
               <a:t>관리</a:t>
             </a:r>
             <a:r>
-              <a:rPr lang="en-US" altLang="ko-KR" sz="1400" dirty="0"/>
+              <a:rPr lang="en-US" altLang="ko-KR" sz="1200" dirty="0">
+                <a:latin typeface="+mn-ea"/>
+              </a:rPr>
               <a:t>: pip, </a:t>
             </a:r>
             <a:r>
-              <a:rPr lang="en-US" altLang="ko-KR" sz="1400" dirty="0" err="1" smtClean="0"/>
+              <a:rPr lang="en-US" altLang="ko-KR" sz="1200" dirty="0" err="1" smtClean="0">
+                <a:latin typeface="+mn-ea"/>
+              </a:rPr>
               <a:t>conda</a:t>
             </a:r>
-            <a:endParaRPr lang="en-US" altLang="ko-KR" sz="1400" dirty="0"/>
+            <a:endParaRPr lang="en-US" altLang="ko-KR" sz="1200" dirty="0">
+              <a:latin typeface="+mn-ea"/>
+            </a:endParaRPr>
           </a:p>
           <a:p>
             <a:pPr marL="0" indent="0">
               <a:buNone/>
             </a:pPr>
-            <a:endParaRPr lang="en-US" altLang="ko-KR" sz="1400" dirty="0" smtClean="0"/>
-          </a:p>
-          <a:p>
-            <a:endParaRPr lang="en-US" altLang="ko-KR" sz="1400" dirty="0" smtClean="0"/>
-          </a:p>
-          <a:p>
-            <a:endParaRPr lang="en-US" altLang="ko-KR" sz="1400" dirty="0"/>
-          </a:p>
-          <a:p>
-            <a:r>
-              <a:rPr lang="ko-KR" altLang="en-US" sz="1400" dirty="0" smtClean="0"/>
+            <a:endParaRPr lang="en-US" altLang="ko-KR" sz="1200" dirty="0" smtClean="0">
+              <a:latin typeface="+mn-ea"/>
+            </a:endParaRPr>
+          </a:p>
+          <a:p>
+            <a:pPr marL="0" indent="0">
+              <a:buNone/>
+            </a:pPr>
+            <a:endParaRPr lang="en-US" altLang="ko-KR" sz="1200" dirty="0">
+              <a:latin typeface="+mn-ea"/>
+            </a:endParaRPr>
+          </a:p>
+          <a:p>
+            <a:pPr marL="0" indent="0">
+              <a:buNone/>
+            </a:pPr>
+            <a:endParaRPr lang="en-US" altLang="ko-KR" sz="1200" dirty="0" smtClean="0">
+              <a:latin typeface="+mn-ea"/>
+            </a:endParaRPr>
+          </a:p>
+          <a:p>
+            <a:pPr marL="0" indent="0">
+              <a:buNone/>
+            </a:pPr>
+            <a:endParaRPr lang="en-US" altLang="ko-KR" sz="1200" dirty="0" smtClean="0">
+              <a:latin typeface="+mn-ea"/>
+            </a:endParaRPr>
+          </a:p>
+          <a:p>
+            <a:pPr marL="0" indent="0">
+              <a:buNone/>
+            </a:pPr>
+            <a:endParaRPr lang="en-US" altLang="ko-KR" sz="1200" dirty="0">
+              <a:latin typeface="+mn-ea"/>
+            </a:endParaRPr>
+          </a:p>
+          <a:p>
+            <a:r>
+              <a:rPr lang="ko-KR" altLang="en-US" sz="1200" dirty="0" smtClean="0">
+                <a:latin typeface="+mn-ea"/>
+              </a:rPr>
               <a:t>개발 프레임워크 및 라이브러리</a:t>
             </a:r>
-            <a:endParaRPr lang="en-US" altLang="ko-KR" sz="1400" dirty="0"/>
+            <a:endParaRPr lang="en-US" altLang="ko-KR" sz="1200" dirty="0">
+              <a:latin typeface="+mn-ea"/>
+            </a:endParaRPr>
           </a:p>
           <a:p>
             <a:pPr marL="0" indent="0">
               <a:buNone/>
             </a:pPr>
             <a:r>
-              <a:rPr lang="en-US" altLang="ko-KR" sz="1400" dirty="0" smtClean="0"/>
+              <a:rPr lang="en-US" altLang="ko-KR" sz="1200" dirty="0" smtClean="0">
+                <a:latin typeface="+mn-ea"/>
+              </a:rPr>
               <a:t>-</a:t>
             </a:r>
             <a:r>
-              <a:rPr lang="ko-KR" altLang="en-US" sz="1400" dirty="0" err="1" smtClean="0"/>
+              <a:rPr lang="ko-KR" altLang="en-US" sz="1200" dirty="0" err="1" smtClean="0">
+                <a:latin typeface="+mn-ea"/>
+              </a:rPr>
               <a:t>백엔드</a:t>
             </a:r>
             <a:r>
-              <a:rPr lang="ko-KR" altLang="en-US" sz="1400" dirty="0" smtClean="0"/>
+              <a:rPr lang="ko-KR" altLang="en-US" sz="1200" dirty="0" smtClean="0">
+                <a:latin typeface="+mn-ea"/>
+              </a:rPr>
               <a:t> </a:t>
             </a:r>
             <a:r>
-              <a:rPr lang="ko-KR" altLang="en-US" sz="1400" dirty="0"/>
+              <a:rPr lang="ko-KR" altLang="en-US" sz="1200" dirty="0">
+                <a:latin typeface="+mn-ea"/>
+              </a:rPr>
               <a:t>프레임워크</a:t>
             </a:r>
             <a:r>
-              <a:rPr lang="en-US" altLang="ko-KR" sz="1400" dirty="0"/>
+              <a:rPr lang="en-US" altLang="ko-KR" sz="1200" dirty="0">
+                <a:latin typeface="+mn-ea"/>
+              </a:rPr>
               <a:t>: Spring Boot, Flutter</a:t>
             </a:r>
           </a:p>
@@ -5305,23 +6021,33 @@
               <a:buNone/>
             </a:pPr>
             <a:r>
-              <a:rPr lang="en-US" altLang="ko-KR" sz="1400" dirty="0" smtClean="0"/>
+              <a:rPr lang="en-US" altLang="ko-KR" sz="1200" dirty="0" smtClean="0">
+                <a:latin typeface="+mn-ea"/>
+              </a:rPr>
               <a:t>-</a:t>
             </a:r>
             <a:r>
-              <a:rPr lang="ko-KR" altLang="en-US" sz="1400" dirty="0" err="1" smtClean="0"/>
+              <a:rPr lang="ko-KR" altLang="en-US" sz="1200" dirty="0" err="1" smtClean="0">
+                <a:latin typeface="+mn-ea"/>
+              </a:rPr>
               <a:t>프론트엔드</a:t>
             </a:r>
             <a:r>
-              <a:rPr lang="ko-KR" altLang="en-US" sz="1400" dirty="0" smtClean="0"/>
+              <a:rPr lang="ko-KR" altLang="en-US" sz="1200" dirty="0" smtClean="0">
+                <a:latin typeface="+mn-ea"/>
+              </a:rPr>
               <a:t> </a:t>
             </a:r>
             <a:r>
-              <a:rPr lang="ko-KR" altLang="en-US" sz="1400" dirty="0"/>
+              <a:rPr lang="ko-KR" altLang="en-US" sz="1200" dirty="0">
+                <a:latin typeface="+mn-ea"/>
+              </a:rPr>
               <a:t>라이브러리</a:t>
             </a:r>
             <a:r>
-              <a:rPr lang="en-US" altLang="ko-KR" sz="1400" dirty="0"/>
+              <a:rPr lang="en-US" altLang="ko-KR" sz="1200" dirty="0">
+                <a:latin typeface="+mn-ea"/>
+              </a:rPr>
               <a:t>:</a:t>
             </a:r>
           </a:p>
@@ -5330,152 +6056,253 @@
               <a:buNone/>
             </a:pPr>
             <a:r>
-              <a:rPr lang="en-US" altLang="ko-KR" sz="1400" dirty="0" smtClean="0"/>
+              <a:rPr lang="en-US" altLang="ko-KR" sz="1200" dirty="0" smtClean="0">
+                <a:latin typeface="+mn-ea"/>
+              </a:rPr>
               <a:t>-</a:t>
             </a:r>
             <a:r>
-              <a:rPr lang="ko-KR" altLang="en-US" sz="1400" dirty="0" smtClean="0"/>
+              <a:rPr lang="ko-KR" altLang="en-US" sz="1200" dirty="0" smtClean="0">
+                <a:latin typeface="+mn-ea"/>
+              </a:rPr>
               <a:t>웹 </a:t>
             </a:r>
             <a:r>
-              <a:rPr lang="ko-KR" altLang="en-US" sz="1400" dirty="0" err="1"/>
+              <a:rPr lang="ko-KR" altLang="en-US" sz="1200" dirty="0" err="1">
+                <a:latin typeface="+mn-ea"/>
+              </a:rPr>
               <a:t>크롤링</a:t>
             </a:r>
             <a:r>
-              <a:rPr lang="ko-KR" altLang="en-US" sz="1400" dirty="0"/>
+              <a:rPr lang="ko-KR" altLang="en-US" sz="1200" dirty="0">
+                <a:latin typeface="+mn-ea"/>
+              </a:rPr>
               <a:t> 라이브러리</a:t>
             </a:r>
             <a:r>
-              <a:rPr lang="en-US" altLang="ko-KR" sz="1400" dirty="0"/>
+              <a:rPr lang="en-US" altLang="ko-KR" sz="1200" dirty="0">
+                <a:latin typeface="+mn-ea"/>
+              </a:rPr>
               <a:t>: </a:t>
             </a:r>
             <a:r>
-              <a:rPr lang="en-US" altLang="ko-KR" sz="1400" dirty="0" err="1"/>
+              <a:rPr lang="en-US" altLang="ko-KR" sz="1200" dirty="0" err="1">
+                <a:latin typeface="+mn-ea"/>
+              </a:rPr>
               <a:t>BeautifulSoup</a:t>
             </a:r>
             <a:r>
-              <a:rPr lang="en-US" altLang="ko-KR" sz="1400" dirty="0"/>
+              <a:rPr lang="en-US" altLang="ko-KR" sz="1200" dirty="0">
+                <a:latin typeface="+mn-ea"/>
+              </a:rPr>
               <a:t>, Selenium</a:t>
             </a:r>
           </a:p>
           <a:p>
-            <a:endParaRPr lang="en-US" altLang="ko-KR" sz="1400" dirty="0"/>
-          </a:p>
-          <a:p>
-            <a:r>
-              <a:rPr lang="ko-KR" altLang="en-US" sz="1400" dirty="0" smtClean="0"/>
+            <a:endParaRPr lang="en-US" altLang="ko-KR" sz="1200" dirty="0">
+              <a:latin typeface="+mn-ea"/>
+            </a:endParaRPr>
+          </a:p>
+          <a:p>
+            <a:r>
+              <a:rPr lang="ko-KR" altLang="en-US" sz="1200" dirty="0" smtClean="0">
+                <a:latin typeface="+mn-ea"/>
+              </a:rPr>
               <a:t>데이터베이스</a:t>
             </a:r>
-            <a:endParaRPr lang="en-US" altLang="ko-KR" sz="1400" dirty="0" smtClean="0"/>
+            <a:endParaRPr lang="en-US" altLang="ko-KR" sz="1200" dirty="0" smtClean="0">
+              <a:latin typeface="+mn-ea"/>
+            </a:endParaRPr>
           </a:p>
           <a:p>
             <a:pPr marL="0" indent="0">
               <a:buNone/>
             </a:pPr>
             <a:r>
-              <a:rPr lang="en-US" altLang="ko-KR" sz="1400" dirty="0" smtClean="0"/>
+              <a:rPr lang="en-US" altLang="ko-KR" sz="1200" dirty="0" smtClean="0">
+                <a:latin typeface="+mn-ea"/>
+              </a:rPr>
               <a:t>-MySQL</a:t>
             </a:r>
           </a:p>
           <a:p>
-            <a:endParaRPr lang="en-US" altLang="ko-KR" sz="1400" dirty="0"/>
-          </a:p>
-          <a:p>
-            <a:r>
-              <a:rPr lang="ko-KR" altLang="en-US" sz="1400" dirty="0" err="1" smtClean="0"/>
+            <a:endParaRPr lang="en-US" altLang="ko-KR" sz="1200" dirty="0">
+              <a:latin typeface="+mn-ea"/>
+            </a:endParaRPr>
+          </a:p>
+          <a:p>
+            <a:r>
+              <a:rPr lang="ko-KR" altLang="en-US" sz="1200" dirty="0" err="1" smtClean="0">
+                <a:latin typeface="+mn-ea"/>
+              </a:rPr>
               <a:t>클라우드</a:t>
             </a:r>
             <a:r>
-              <a:rPr lang="ko-KR" altLang="en-US" sz="1400" dirty="0" smtClean="0"/>
+              <a:rPr lang="ko-KR" altLang="en-US" sz="1200" dirty="0" smtClean="0">
+                <a:latin typeface="+mn-ea"/>
+              </a:rPr>
               <a:t> 및 배포 환경</a:t>
             </a:r>
-            <a:endParaRPr lang="en-US" altLang="ko-KR" sz="1400" dirty="0" smtClean="0"/>
+            <a:endParaRPr lang="en-US" altLang="ko-KR" sz="1200" dirty="0" smtClean="0">
+              <a:latin typeface="+mn-ea"/>
+            </a:endParaRPr>
           </a:p>
           <a:p>
             <a:pPr marL="0" indent="0">
               <a:buNone/>
             </a:pPr>
             <a:r>
-              <a:rPr lang="en-US" altLang="ko-KR" sz="1400" dirty="0" smtClean="0"/>
+              <a:rPr lang="en-US" altLang="ko-KR" sz="1200" dirty="0" smtClean="0">
+                <a:latin typeface="+mn-ea"/>
+              </a:rPr>
               <a:t>-</a:t>
             </a:r>
             <a:r>
-              <a:rPr lang="ko-KR" altLang="en-US" sz="1400" dirty="0" err="1" smtClean="0"/>
+              <a:rPr lang="ko-KR" altLang="en-US" sz="1200" dirty="0" err="1" smtClean="0">
+                <a:latin typeface="+mn-ea"/>
+              </a:rPr>
               <a:t>클라우드</a:t>
             </a:r>
             <a:r>
-              <a:rPr lang="ko-KR" altLang="en-US" sz="1400" dirty="0" smtClean="0"/>
+              <a:rPr lang="ko-KR" altLang="en-US" sz="1200" dirty="0" smtClean="0">
+                <a:latin typeface="+mn-ea"/>
+              </a:rPr>
               <a:t> </a:t>
             </a:r>
             <a:r>
-              <a:rPr lang="ko-KR" altLang="en-US" sz="1400" dirty="0" err="1"/>
+              <a:rPr lang="ko-KR" altLang="en-US" sz="1200" dirty="0" err="1">
+                <a:latin typeface="+mn-ea"/>
+              </a:rPr>
               <a:t>프랫폼</a:t>
             </a:r>
-            <a:endParaRPr lang="en-US" altLang="ko-KR" sz="1400" dirty="0"/>
+            <a:endParaRPr lang="en-US" altLang="ko-KR" sz="1200" dirty="0">
+              <a:latin typeface="+mn-ea"/>
+            </a:endParaRPr>
           </a:p>
           <a:p>
             <a:pPr marL="0" indent="0">
               <a:buNone/>
             </a:pPr>
             <a:r>
-              <a:rPr lang="en-US" altLang="ko-KR" sz="1400" dirty="0" smtClean="0"/>
+              <a:rPr lang="en-US" altLang="ko-KR" sz="1200" dirty="0" smtClean="0">
+                <a:latin typeface="+mn-ea"/>
+              </a:rPr>
               <a:t>-</a:t>
             </a:r>
             <a:r>
-              <a:rPr lang="ko-KR" altLang="en-US" sz="1400" dirty="0" smtClean="0"/>
+              <a:rPr lang="ko-KR" altLang="en-US" sz="1200" dirty="0" smtClean="0">
+                <a:latin typeface="+mn-ea"/>
+              </a:rPr>
               <a:t>컨테이너</a:t>
             </a:r>
-            <a:endParaRPr lang="en-US" altLang="ko-KR" sz="1400" dirty="0"/>
+            <a:endParaRPr lang="en-US" altLang="ko-KR" sz="1200" dirty="0">
+              <a:latin typeface="+mn-ea"/>
+            </a:endParaRPr>
           </a:p>
           <a:p>
             <a:pPr marL="0" indent="0">
               <a:buNone/>
             </a:pPr>
             <a:r>
-              <a:rPr lang="en-US" altLang="ko-KR" sz="1400" dirty="0" smtClean="0"/>
+              <a:rPr lang="en-US" altLang="ko-KR" sz="1200" dirty="0" smtClean="0">
+                <a:latin typeface="+mn-ea"/>
+              </a:rPr>
               <a:t>-</a:t>
             </a:r>
             <a:r>
-              <a:rPr lang="ko-KR" altLang="en-US" sz="1400" dirty="0" smtClean="0"/>
+              <a:rPr lang="ko-KR" altLang="en-US" sz="1200" dirty="0" smtClean="0">
+                <a:latin typeface="+mn-ea"/>
+              </a:rPr>
               <a:t>웹 </a:t>
             </a:r>
             <a:r>
-              <a:rPr lang="ko-KR" altLang="en-US" sz="1400" dirty="0"/>
+              <a:rPr lang="ko-KR" altLang="en-US" sz="1200" dirty="0">
+                <a:latin typeface="+mn-ea"/>
+              </a:rPr>
               <a:t>서버</a:t>
             </a:r>
             <a:r>
-              <a:rPr lang="en-US" altLang="ko-KR" sz="1400" dirty="0"/>
+              <a:rPr lang="en-US" altLang="ko-KR" sz="1200" dirty="0">
+                <a:latin typeface="+mn-ea"/>
+              </a:rPr>
               <a:t>: </a:t>
             </a:r>
             <a:r>
-              <a:rPr lang="en-US" altLang="ko-KR" sz="1400" dirty="0" smtClean="0"/>
+              <a:rPr lang="en-US" altLang="ko-KR" sz="1200" dirty="0" smtClean="0">
+                <a:latin typeface="+mn-ea"/>
+              </a:rPr>
               <a:t>Apache</a:t>
             </a:r>
           </a:p>
           <a:p>
-            <a:endParaRPr lang="en-US" altLang="ko-KR" sz="1400" dirty="0"/>
-          </a:p>
-          <a:p>
-            <a:r>
-              <a:rPr lang="ko-KR" altLang="en-US" sz="1400" dirty="0" smtClean="0"/>
+            <a:endParaRPr lang="en-US" altLang="ko-KR" sz="1200" dirty="0" smtClean="0">
+              <a:latin typeface="+mn-ea"/>
+            </a:endParaRPr>
+          </a:p>
+          <a:p>
+            <a:endParaRPr lang="en-US" altLang="ko-KR" sz="1200" dirty="0">
+              <a:latin typeface="+mn-ea"/>
+            </a:endParaRPr>
+          </a:p>
+          <a:p>
+            <a:endParaRPr lang="en-US" altLang="ko-KR" sz="1200" dirty="0" smtClean="0">
+              <a:latin typeface="+mn-ea"/>
+            </a:endParaRPr>
+          </a:p>
+          <a:p>
+            <a:endParaRPr lang="en-US" altLang="ko-KR" sz="1200" dirty="0">
+              <a:latin typeface="+mn-ea"/>
+            </a:endParaRPr>
+          </a:p>
+          <a:p>
+            <a:endParaRPr lang="en-US" altLang="ko-KR" sz="1200" dirty="0" smtClean="0">
+              <a:latin typeface="+mn-ea"/>
+            </a:endParaRPr>
+          </a:p>
+          <a:p>
+            <a:endParaRPr lang="en-US" altLang="ko-KR" sz="1200" dirty="0">
+              <a:latin typeface="+mn-ea"/>
+            </a:endParaRPr>
+          </a:p>
+          <a:p>
+            <a:pPr marL="0" indent="0">
+              <a:buNone/>
+            </a:pPr>
+            <a:endParaRPr lang="en-US" altLang="ko-KR" sz="1200" dirty="0">
+              <a:latin typeface="+mn-ea"/>
+            </a:endParaRPr>
+          </a:p>
+          <a:p>
+            <a:r>
+              <a:rPr lang="ko-KR" altLang="en-US" sz="1200" dirty="0" smtClean="0">
+                <a:latin typeface="+mn-ea"/>
+              </a:rPr>
               <a:t>테스트 및 품질 관리 도구</a:t>
             </a:r>
-            <a:endParaRPr lang="en-US" altLang="ko-KR" sz="1400" dirty="0" smtClean="0"/>
+            <a:endParaRPr lang="en-US" altLang="ko-KR" sz="1200" dirty="0" smtClean="0">
+              <a:latin typeface="+mn-ea"/>
+            </a:endParaRPr>
           </a:p>
           <a:p>
             <a:pPr marL="0" indent="0">
               <a:buNone/>
             </a:pPr>
             <a:r>
-              <a:rPr lang="en-US" altLang="ko-KR" sz="1400" dirty="0" smtClean="0"/>
+              <a:rPr lang="en-US" altLang="ko-KR" sz="1200" dirty="0" smtClean="0">
+                <a:latin typeface="+mn-ea"/>
+              </a:rPr>
               <a:t>-</a:t>
             </a:r>
             <a:r>
-              <a:rPr lang="ko-KR" altLang="en-US" sz="1400" dirty="0" smtClean="0"/>
+              <a:rPr lang="ko-KR" altLang="en-US" sz="1200" dirty="0" smtClean="0">
+                <a:latin typeface="+mn-ea"/>
+              </a:rPr>
               <a:t>테스트 도구</a:t>
             </a:r>
             <a:r>
-              <a:rPr lang="en-US" altLang="ko-KR" sz="1400" dirty="0" smtClean="0"/>
+              <a:rPr lang="en-US" altLang="ko-KR" sz="1200" dirty="0" smtClean="0">
+                <a:latin typeface="+mn-ea"/>
+              </a:rPr>
               <a:t>: Selenium</a:t>
             </a:r>
           </a:p>
@@ -5484,51 +6311,81 @@
               <a:buNone/>
             </a:pPr>
             <a:r>
-              <a:rPr lang="en-US" altLang="ko-KR" sz="1400" dirty="0" smtClean="0"/>
+              <a:rPr lang="en-US" altLang="ko-KR" sz="1200" dirty="0" smtClean="0">
+                <a:latin typeface="+mn-ea"/>
+              </a:rPr>
               <a:t>-</a:t>
             </a:r>
             <a:r>
-              <a:rPr lang="ko-KR" altLang="en-US" sz="1400" dirty="0" smtClean="0"/>
+              <a:rPr lang="ko-KR" altLang="en-US" sz="1200" dirty="0" smtClean="0">
+                <a:latin typeface="+mn-ea"/>
+              </a:rPr>
               <a:t>코드 품질 관리</a:t>
             </a:r>
             <a:r>
-              <a:rPr lang="en-US" altLang="ko-KR" sz="1400" dirty="0" smtClean="0"/>
+              <a:rPr lang="en-US" altLang="ko-KR" sz="1200" dirty="0" smtClean="0">
+                <a:latin typeface="+mn-ea"/>
+              </a:rPr>
               <a:t>: </a:t>
             </a:r>
             <a:r>
-              <a:rPr lang="en-US" altLang="ko-KR" sz="1400" dirty="0" err="1"/>
+              <a:rPr lang="en-US" altLang="ko-KR" sz="1200" dirty="0" err="1">
+                <a:latin typeface="+mn-ea"/>
+              </a:rPr>
               <a:t>ESLint</a:t>
             </a:r>
             <a:r>
-              <a:rPr lang="en-US" altLang="ko-KR" sz="1400" dirty="0"/>
+              <a:rPr lang="en-US" altLang="ko-KR" sz="1200" dirty="0">
+                <a:latin typeface="+mn-ea"/>
+              </a:rPr>
               <a:t>, </a:t>
             </a:r>
             <a:r>
-              <a:rPr lang="en-US" altLang="ko-KR" sz="1400" dirty="0" smtClean="0"/>
+              <a:rPr lang="en-US" altLang="ko-KR" sz="1200" dirty="0" smtClean="0">
+                <a:latin typeface="+mn-ea"/>
+              </a:rPr>
               <a:t>Prettier</a:t>
             </a:r>
           </a:p>
           <a:p>
-            <a:r>
-              <a:rPr lang="ko-KR" altLang="en-US" sz="1400" dirty="0" smtClean="0"/>
+            <a:pPr marL="0" indent="0">
+              <a:buNone/>
+            </a:pPr>
+            <a:endParaRPr lang="en-US" altLang="ko-KR" sz="1200" dirty="0" smtClean="0">
+              <a:latin typeface="+mn-ea"/>
+            </a:endParaRPr>
+          </a:p>
+          <a:p>
+            <a:r>
+              <a:rPr lang="ko-KR" altLang="en-US" sz="1200" dirty="0" smtClean="0">
+                <a:latin typeface="+mn-ea"/>
+              </a:rPr>
               <a:t>네트워크 및 기타 도구</a:t>
             </a:r>
-            <a:endParaRPr lang="en-US" altLang="ko-KR" sz="1400" dirty="0" smtClean="0"/>
+            <a:endParaRPr lang="en-US" altLang="ko-KR" sz="1200" dirty="0" smtClean="0">
+              <a:latin typeface="+mn-ea"/>
+            </a:endParaRPr>
           </a:p>
           <a:p>
             <a:pPr marL="0" indent="0">
               <a:buNone/>
             </a:pPr>
             <a:r>
-              <a:rPr lang="en-US" altLang="ko-KR" sz="1400" dirty="0" smtClean="0"/>
+              <a:rPr lang="en-US" altLang="ko-KR" sz="1200" dirty="0" smtClean="0">
+                <a:latin typeface="+mn-ea"/>
+              </a:rPr>
               <a:t>-</a:t>
             </a:r>
             <a:r>
-              <a:rPr lang="ko-KR" altLang="en-US" sz="1400" dirty="0" smtClean="0"/>
+              <a:rPr lang="ko-KR" altLang="en-US" sz="1200" dirty="0" smtClean="0">
+                <a:latin typeface="+mn-ea"/>
+              </a:rPr>
               <a:t>협업 도구</a:t>
             </a:r>
             <a:r>
-              <a:rPr lang="en-US" altLang="ko-KR" sz="1400" dirty="0" smtClean="0"/>
+              <a:rPr lang="en-US" altLang="ko-KR" sz="1200" dirty="0" smtClean="0">
+                <a:latin typeface="+mn-ea"/>
+              </a:rPr>
               <a:t>: GitHub</a:t>
             </a:r>
           </a:p>
@@ -5536,61 +6393,87 @@
             <a:pPr marL="0" indent="0">
               <a:buNone/>
             </a:pPr>
-            <a:endParaRPr lang="en-US" altLang="ko-KR" sz="1400" dirty="0" smtClean="0"/>
-          </a:p>
-          <a:p>
-            <a:endParaRPr lang="en-US" altLang="ko-KR" sz="1400" dirty="0"/>
-          </a:p>
-          <a:p>
-            <a:endParaRPr lang="en-US" altLang="ko-KR" sz="1400" dirty="0"/>
-          </a:p>
-          <a:p>
-            <a:endParaRPr lang="en-US" altLang="ko-KR" sz="1400" dirty="0" smtClean="0"/>
-          </a:p>
-          <a:p>
-            <a:endParaRPr lang="en-US" altLang="ko-KR" sz="1400" dirty="0"/>
-          </a:p>
-          <a:p>
-            <a:endParaRPr lang="en-US" altLang="ko-KR" sz="1400" dirty="0" smtClean="0"/>
-          </a:p>
-          <a:p>
-            <a:endParaRPr lang="en-US" altLang="ko-KR" sz="1400" dirty="0"/>
-          </a:p>
-          <a:p>
-            <a:endParaRPr lang="en-US" altLang="ko-KR" sz="1400" dirty="0"/>
-          </a:p>
-          <a:p>
-            <a:endParaRPr lang="en-US" altLang="ko-KR" sz="1400" dirty="0" smtClean="0"/>
+            <a:endParaRPr lang="en-US" altLang="ko-KR" sz="1200" dirty="0" smtClean="0">
+              <a:latin typeface="+mn-ea"/>
+            </a:endParaRPr>
+          </a:p>
+          <a:p>
+            <a:endParaRPr lang="en-US" altLang="ko-KR" sz="1200" dirty="0">
+              <a:latin typeface="+mn-ea"/>
+            </a:endParaRPr>
+          </a:p>
+          <a:p>
+            <a:endParaRPr lang="en-US" altLang="ko-KR" sz="1200" dirty="0">
+              <a:latin typeface="+mn-ea"/>
+            </a:endParaRPr>
+          </a:p>
+          <a:p>
+            <a:endParaRPr lang="en-US" altLang="ko-KR" sz="1200" dirty="0" smtClean="0">
+              <a:latin typeface="+mn-ea"/>
+            </a:endParaRPr>
+          </a:p>
+          <a:p>
+            <a:endParaRPr lang="en-US" altLang="ko-KR" sz="1200" dirty="0">
+              <a:latin typeface="+mn-ea"/>
+            </a:endParaRPr>
+          </a:p>
+          <a:p>
+            <a:endParaRPr lang="en-US" altLang="ko-KR" sz="1200" dirty="0" smtClean="0">
+              <a:latin typeface="+mn-ea"/>
+            </a:endParaRPr>
+          </a:p>
+          <a:p>
+            <a:endParaRPr lang="en-US" altLang="ko-KR" sz="1200" dirty="0">
+              <a:latin typeface="+mn-ea"/>
+            </a:endParaRPr>
+          </a:p>
+          <a:p>
+            <a:endParaRPr lang="en-US" altLang="ko-KR" sz="1200" dirty="0">
+              <a:latin typeface="+mn-ea"/>
+            </a:endParaRPr>
+          </a:p>
+          <a:p>
+            <a:endParaRPr lang="en-US" altLang="ko-KR" sz="1200" dirty="0" smtClean="0">
+              <a:latin typeface="+mn-ea"/>
+            </a:endParaRPr>
           </a:p>
           <a:p>
             <a:pPr marL="0" indent="0">
               <a:buNone/>
             </a:pPr>
-            <a:endParaRPr lang="en-US" altLang="ko-KR" sz="1400" dirty="0"/>
+            <a:endParaRPr lang="en-US" altLang="ko-KR" sz="1200" dirty="0">
+              <a:latin typeface="+mn-ea"/>
+            </a:endParaRPr>
           </a:p>
           <a:p>
             <a:pPr marL="0" indent="0">
               <a:buNone/>
             </a:pPr>
-            <a:endParaRPr lang="en-US" altLang="ko-KR" sz="1400" dirty="0" smtClean="0"/>
-          </a:p>
-          <a:p>
-            <a:endParaRPr lang="en-US" altLang="ko-KR" sz="1400" dirty="0" smtClean="0"/>
-          </a:p>
-          <a:p>
-            <a:endParaRPr lang="en-US" altLang="ko-KR" sz="1400" dirty="0"/>
-          </a:p>
-        </p:txBody>
-      </p:sp>
-      <p:sp>
-        <p:nvSpPr>
-          <p:cNvPr id="23" name="TextBox 22"/>
+            <a:endParaRPr lang="en-US" altLang="ko-KR" sz="1200" dirty="0" smtClean="0">
+              <a:latin typeface="+mn-ea"/>
+            </a:endParaRPr>
+          </a:p>
+          <a:p>
+            <a:endParaRPr lang="en-US" altLang="ko-KR" sz="1200" dirty="0" smtClean="0">
+              <a:latin typeface="+mn-ea"/>
+            </a:endParaRPr>
+          </a:p>
+          <a:p>
+            <a:endParaRPr lang="en-US" altLang="ko-KR" sz="1200" dirty="0">
+              <a:latin typeface="+mn-ea"/>
+            </a:endParaRPr>
+          </a:p>
+        </p:txBody>
+      </p:sp>
+      <p:sp>
+        <p:nvSpPr>
+          <p:cNvPr id="4" name="TextBox 3"/>
           <p:cNvSpPr txBox="1"/>
           <p:nvPr/>
         </p:nvSpPr>
         <p:spPr>
           <a:xfrm>
-            <a:off x="9378891" y="209725"/>
+            <a:off x="9728346" y="201336"/>
             <a:ext cx="1907895" cy="584775"/>
           </a:xfrm>
           <a:prstGeom prst="rect">
@@ -5604,6 +6487,7 @@
           </a:bodyPr>
           <a:lstStyle/>
           <a:p>
+            <a:pPr algn="r"/>
             <a:r>
               <a:rPr lang="ko-KR" altLang="en-US" sz="3200" dirty="0" smtClean="0">
                 <a:solidFill>
@@ -5705,6 +6589,1741 @@
     <p:extLst>
       <p:ext uri="{BB962C8B-B14F-4D97-AF65-F5344CB8AC3E}">
         <p14:creationId xmlns:p14="http://schemas.microsoft.com/office/powerpoint/2010/main" val="686895806"/>
+      </p:ext>
+    </p:extLst>
+  </p:cSld>
+  <p:clrMapOvr>
+    <a:masterClrMapping/>
+  </p:clrMapOvr>
+</p:sld>
+</file>
+
+<file path=ppt/slides/slide8.xml><?xml version="1.0" encoding="utf-8"?>
+<p:sld xmlns:a="http://schemas.openxmlformats.org/drawingml/2006/main" xmlns:r="http://schemas.openxmlformats.org/officeDocument/2006/relationships" xmlns:p="http://schemas.openxmlformats.org/presentationml/2006/main">
+  <p:cSld>
+    <p:spTree>
+      <p:nvGrpSpPr>
+        <p:cNvPr id="1" name=""/>
+        <p:cNvGrpSpPr/>
+        <p:nvPr/>
+      </p:nvGrpSpPr>
+      <p:grpSpPr>
+        <a:xfrm>
+          <a:off x="0" y="0"/>
+          <a:ext cx="0" cy="0"/>
+          <a:chOff x="0" y="0"/>
+          <a:chExt cx="0" cy="0"/>
+        </a:xfrm>
+      </p:grpSpPr>
+      <p:sp>
+        <p:nvSpPr>
+          <p:cNvPr id="2" name="TextBox 1"/>
+          <p:cNvSpPr txBox="1"/>
+          <p:nvPr/>
+        </p:nvSpPr>
+        <p:spPr>
+          <a:xfrm>
+            <a:off x="9127221" y="201336"/>
+            <a:ext cx="2509020" cy="584775"/>
+          </a:xfrm>
+          <a:prstGeom prst="rect">
+            <a:avLst/>
+          </a:prstGeom>
+          <a:noFill/>
+        </p:spPr>
+        <p:txBody>
+          <a:bodyPr wrap="none" rtlCol="0">
+            <a:spAutoFit/>
+          </a:bodyPr>
+          <a:lstStyle/>
+          <a:p>
+            <a:pPr algn="r"/>
+            <a:r>
+              <a:rPr lang="en-US" altLang="ko-KR" sz="3200" dirty="0" smtClean="0">
+                <a:solidFill>
+                  <a:schemeClr val="bg1"/>
+                </a:solidFill>
+              </a:rPr>
+              <a:t>DB </a:t>
+            </a:r>
+            <a:r>
+              <a:rPr lang="ko-KR" altLang="en-US" sz="3200" dirty="0" smtClean="0">
+                <a:solidFill>
+                  <a:schemeClr val="bg1"/>
+                </a:solidFill>
+              </a:rPr>
+              <a:t>서버 구축</a:t>
+            </a:r>
+            <a:endParaRPr lang="ko-KR" altLang="en-US" sz="3200" dirty="0">
+              <a:solidFill>
+                <a:schemeClr val="bg1"/>
+              </a:solidFill>
+            </a:endParaRPr>
+          </a:p>
+        </p:txBody>
+      </p:sp>
+      <p:sp>
+        <p:nvSpPr>
+          <p:cNvPr id="3" name="TextBox 2"/>
+          <p:cNvSpPr txBox="1"/>
+          <p:nvPr/>
+        </p:nvSpPr>
+        <p:spPr>
+          <a:xfrm>
+            <a:off x="4683211" y="2063578"/>
+            <a:ext cx="184731" cy="369332"/>
+          </a:xfrm>
+          <a:prstGeom prst="rect">
+            <a:avLst/>
+          </a:prstGeom>
+          <a:noFill/>
+        </p:spPr>
+        <p:txBody>
+          <a:bodyPr wrap="none" rtlCol="0">
+            <a:spAutoFit/>
+          </a:bodyPr>
+          <a:lstStyle/>
+          <a:p>
+            <a:endParaRPr lang="ko-KR" altLang="en-US" dirty="0"/>
+          </a:p>
+        </p:txBody>
+      </p:sp>
+      <p:sp>
+        <p:nvSpPr>
+          <p:cNvPr id="4" name="TextBox 3"/>
+          <p:cNvSpPr txBox="1"/>
+          <p:nvPr/>
+        </p:nvSpPr>
+        <p:spPr>
+          <a:xfrm>
+            <a:off x="4683211" y="1606378"/>
+            <a:ext cx="45719" cy="369332"/>
+          </a:xfrm>
+          <a:prstGeom prst="rect">
+            <a:avLst/>
+          </a:prstGeom>
+          <a:noFill/>
+        </p:spPr>
+        <p:txBody>
+          <a:bodyPr wrap="square" rtlCol="0">
+            <a:spAutoFit/>
+          </a:bodyPr>
+          <a:lstStyle/>
+          <a:p>
+            <a:endParaRPr lang="ko-KR" altLang="en-US" dirty="0"/>
+          </a:p>
+        </p:txBody>
+      </p:sp>
+      <p:sp>
+        <p:nvSpPr>
+          <p:cNvPr id="5" name="TextBox 4"/>
+          <p:cNvSpPr txBox="1"/>
+          <p:nvPr/>
+        </p:nvSpPr>
+        <p:spPr>
+          <a:xfrm>
+            <a:off x="736078" y="1178540"/>
+            <a:ext cx="5152767" cy="3108543"/>
+          </a:xfrm>
+          <a:prstGeom prst="rect">
+            <a:avLst/>
+          </a:prstGeom>
+          <a:noFill/>
+        </p:spPr>
+        <p:txBody>
+          <a:bodyPr wrap="square" rtlCol="0">
+            <a:spAutoFit/>
+          </a:bodyPr>
+          <a:lstStyle/>
+          <a:p>
+            <a:r>
+              <a:rPr lang="ko-KR" altLang="en-US" sz="1600" b="1" dirty="0" smtClean="0">
+                <a:latin typeface="+mn-ea"/>
+              </a:rPr>
+              <a:t>계정 생성 후 루트 권한 부여</a:t>
+            </a:r>
+            <a:endParaRPr lang="en-US" altLang="ko-KR" sz="1600" b="1" dirty="0" smtClean="0">
+              <a:latin typeface="+mn-ea"/>
+            </a:endParaRPr>
+          </a:p>
+          <a:p>
+            <a:endParaRPr lang="en-US" altLang="ko-KR" sz="1200" dirty="0">
+              <a:latin typeface="+mn-ea"/>
+            </a:endParaRPr>
+          </a:p>
+          <a:p>
+            <a:r>
+              <a:rPr lang="ko-KR" altLang="en-US" sz="1200" dirty="0" smtClean="0">
+                <a:latin typeface="+mn-ea"/>
+              </a:rPr>
+              <a:t>사용자 계정을 생성</a:t>
+            </a:r>
+            <a:endParaRPr lang="en-US" altLang="ko-KR" sz="1200" dirty="0" smtClean="0">
+              <a:latin typeface="+mn-ea"/>
+            </a:endParaRPr>
+          </a:p>
+          <a:p>
+            <a:r>
+              <a:rPr lang="en-US" altLang="ko-KR" sz="1200" dirty="0" smtClean="0">
+                <a:latin typeface="+mn-ea"/>
+              </a:rPr>
+              <a:t>sixtick@sixtick-sub2</a:t>
+            </a:r>
+            <a:r>
+              <a:rPr lang="en-US" altLang="ko-KR" sz="1200" dirty="0">
+                <a:latin typeface="+mn-ea"/>
+              </a:rPr>
+              <a:t>:~$ </a:t>
+            </a:r>
+            <a:r>
+              <a:rPr lang="en-US" altLang="ko-KR" sz="1200" dirty="0" err="1">
+                <a:latin typeface="+mn-ea"/>
+              </a:rPr>
+              <a:t>sudo</a:t>
+            </a:r>
+            <a:r>
+              <a:rPr lang="en-US" altLang="ko-KR" sz="1200" dirty="0">
+                <a:latin typeface="+mn-ea"/>
+              </a:rPr>
+              <a:t> </a:t>
+            </a:r>
+            <a:r>
+              <a:rPr lang="en-US" altLang="ko-KR" sz="1200" dirty="0" err="1">
+                <a:latin typeface="+mn-ea"/>
+              </a:rPr>
+              <a:t>adduser</a:t>
+            </a:r>
+            <a:r>
+              <a:rPr lang="en-US" altLang="ko-KR" sz="1200" dirty="0">
+                <a:latin typeface="+mn-ea"/>
+              </a:rPr>
+              <a:t> </a:t>
+            </a:r>
+            <a:r>
+              <a:rPr lang="en-US" altLang="ko-KR" sz="1200" dirty="0" err="1" smtClean="0">
+                <a:latin typeface="+mn-ea"/>
+              </a:rPr>
+              <a:t>ahncy</a:t>
+            </a:r>
+            <a:endParaRPr lang="en-US" altLang="ko-KR" sz="1200" dirty="0" smtClean="0">
+              <a:latin typeface="+mn-ea"/>
+            </a:endParaRPr>
+          </a:p>
+          <a:p>
+            <a:endParaRPr lang="en-US" altLang="ko-KR" sz="1200" dirty="0" smtClean="0">
+              <a:latin typeface="+mn-ea"/>
+            </a:endParaRPr>
+          </a:p>
+          <a:p>
+            <a:r>
+              <a:rPr lang="en-US" altLang="ko-KR" sz="1200" dirty="0" err="1">
+                <a:latin typeface="+mn-ea"/>
+              </a:rPr>
+              <a:t>a</a:t>
+            </a:r>
+            <a:r>
+              <a:rPr lang="en-US" altLang="ko-KR" sz="1200" dirty="0" err="1" smtClean="0">
+                <a:latin typeface="+mn-ea"/>
+              </a:rPr>
+              <a:t>hncy</a:t>
+            </a:r>
+            <a:r>
+              <a:rPr lang="ko-KR" altLang="en-US" sz="1200" dirty="0" smtClean="0">
+                <a:latin typeface="+mn-ea"/>
+              </a:rPr>
+              <a:t>라는 사용자에게 루트 권한을 부여하기 위해 </a:t>
+            </a:r>
+            <a:r>
+              <a:rPr lang="en-US" altLang="ko-KR" sz="1200" dirty="0" err="1" smtClean="0">
+                <a:latin typeface="+mn-ea"/>
+              </a:rPr>
+              <a:t>visudo</a:t>
+            </a:r>
+            <a:r>
+              <a:rPr lang="ko-KR" altLang="en-US" sz="1200" dirty="0" smtClean="0">
+                <a:latin typeface="+mn-ea"/>
+              </a:rPr>
+              <a:t>라는 명령어를 이용해 </a:t>
+            </a:r>
+            <a:r>
+              <a:rPr lang="en-US" altLang="ko-KR" sz="1200" dirty="0" err="1" smtClean="0">
+                <a:latin typeface="+mn-ea"/>
+              </a:rPr>
+              <a:t>sudoers</a:t>
+            </a:r>
+            <a:r>
+              <a:rPr lang="en-US" altLang="ko-KR" sz="1200" dirty="0" smtClean="0">
+                <a:latin typeface="+mn-ea"/>
+              </a:rPr>
+              <a:t> </a:t>
+            </a:r>
+            <a:r>
+              <a:rPr lang="ko-KR" altLang="en-US" sz="1200" dirty="0" smtClean="0">
+                <a:latin typeface="+mn-ea"/>
+              </a:rPr>
+              <a:t>파일을 편집</a:t>
+            </a:r>
+            <a:endParaRPr lang="en-US" altLang="ko-KR" sz="1200" dirty="0">
+              <a:latin typeface="+mn-ea"/>
+            </a:endParaRPr>
+          </a:p>
+          <a:p>
+            <a:r>
+              <a:rPr lang="en-US" altLang="ko-KR" sz="1200" dirty="0">
+                <a:latin typeface="+mn-ea"/>
+              </a:rPr>
+              <a:t>root@sixtick-sub2:~# </a:t>
+            </a:r>
+            <a:r>
+              <a:rPr lang="en-US" altLang="ko-KR" sz="1200" dirty="0" err="1">
+                <a:latin typeface="+mn-ea"/>
+              </a:rPr>
+              <a:t>sudo</a:t>
+            </a:r>
+            <a:r>
+              <a:rPr lang="en-US" altLang="ko-KR" sz="1200" dirty="0">
+                <a:latin typeface="+mn-ea"/>
+              </a:rPr>
+              <a:t> </a:t>
+            </a:r>
+            <a:r>
+              <a:rPr lang="en-US" altLang="ko-KR" sz="1200" dirty="0" err="1" smtClean="0">
+                <a:latin typeface="+mn-ea"/>
+              </a:rPr>
+              <a:t>visudo</a:t>
+            </a:r>
+            <a:endParaRPr lang="en-US" altLang="ko-KR" sz="1200" dirty="0" smtClean="0">
+              <a:latin typeface="+mn-ea"/>
+            </a:endParaRPr>
+          </a:p>
+          <a:p>
+            <a:endParaRPr lang="en-US" altLang="ko-KR" sz="1200" dirty="0">
+              <a:latin typeface="+mn-ea"/>
+            </a:endParaRPr>
+          </a:p>
+          <a:p>
+            <a:r>
+              <a:rPr lang="ko-KR" altLang="en-US" sz="1200" dirty="0" smtClean="0">
+                <a:latin typeface="+mn-ea"/>
+              </a:rPr>
+              <a:t>파일의 끝 부분에 다음과 같은 내용을 추가함</a:t>
+            </a:r>
+            <a:endParaRPr lang="en-US" altLang="ko-KR" sz="1200" dirty="0" smtClean="0">
+              <a:latin typeface="+mn-ea"/>
+            </a:endParaRPr>
+          </a:p>
+          <a:p>
+            <a:r>
+              <a:rPr lang="en-US" altLang="ko-KR" sz="1200" dirty="0" err="1">
+                <a:latin typeface="+mn-ea"/>
+              </a:rPr>
+              <a:t>a</a:t>
+            </a:r>
+            <a:r>
+              <a:rPr lang="en-US" altLang="ko-KR" sz="1200" dirty="0" err="1" smtClean="0">
+                <a:latin typeface="+mn-ea"/>
+              </a:rPr>
+              <a:t>hncy</a:t>
+            </a:r>
+            <a:r>
+              <a:rPr lang="ko-KR" altLang="en-US" sz="1200" dirty="0" smtClean="0">
+                <a:latin typeface="+mn-ea"/>
+              </a:rPr>
+              <a:t> </a:t>
+            </a:r>
+            <a:r>
+              <a:rPr lang="en-US" altLang="ko-KR" sz="1200" dirty="0" smtClean="0">
+                <a:latin typeface="+mn-ea"/>
+              </a:rPr>
+              <a:t>ALL</a:t>
+            </a:r>
+            <a:r>
+              <a:rPr lang="en-US" altLang="ko-KR" sz="1200" dirty="0">
+                <a:latin typeface="+mn-ea"/>
+              </a:rPr>
+              <a:t>=(ALL) </a:t>
+            </a:r>
+            <a:r>
+              <a:rPr lang="en-US" altLang="ko-KR" sz="1200" dirty="0" smtClean="0">
+                <a:latin typeface="+mn-ea"/>
+              </a:rPr>
+              <a:t>ALL</a:t>
+            </a:r>
+          </a:p>
+          <a:p>
+            <a:endParaRPr lang="en-US" altLang="ko-KR" sz="1200" dirty="0" smtClean="0">
+              <a:latin typeface="+mn-ea"/>
+            </a:endParaRPr>
+          </a:p>
+          <a:p>
+            <a:r>
+              <a:rPr lang="ko-KR" altLang="en-US" sz="1200" dirty="0" smtClean="0">
+                <a:latin typeface="+mn-ea"/>
+              </a:rPr>
+              <a:t>루트 권한 부여 확인 완료</a:t>
+            </a:r>
+            <a:endParaRPr lang="en-US" altLang="ko-KR" sz="1200" dirty="0">
+              <a:latin typeface="+mn-ea"/>
+            </a:endParaRPr>
+          </a:p>
+          <a:p>
+            <a:r>
+              <a:rPr lang="en-US" altLang="ko-KR" sz="1200" dirty="0">
+                <a:latin typeface="+mn-ea"/>
+              </a:rPr>
+              <a:t>ahncy@sixtick-sub2:~$ </a:t>
+            </a:r>
+            <a:r>
+              <a:rPr lang="en-US" altLang="ko-KR" sz="1200" dirty="0" err="1">
+                <a:latin typeface="+mn-ea"/>
+              </a:rPr>
+              <a:t>sudo</a:t>
+            </a:r>
+            <a:r>
+              <a:rPr lang="en-US" altLang="ko-KR" sz="1200" dirty="0">
+                <a:latin typeface="+mn-ea"/>
+              </a:rPr>
+              <a:t> </a:t>
+            </a:r>
+            <a:r>
+              <a:rPr lang="en-US" altLang="ko-KR" sz="1200" dirty="0" err="1">
+                <a:latin typeface="+mn-ea"/>
+              </a:rPr>
+              <a:t>whoami</a:t>
+            </a:r>
+            <a:endParaRPr lang="en-US" altLang="ko-KR" sz="1200" dirty="0">
+              <a:latin typeface="+mn-ea"/>
+            </a:endParaRPr>
+          </a:p>
+          <a:p>
+            <a:r>
+              <a:rPr lang="en-US" altLang="ko-KR" sz="1200" dirty="0">
+                <a:latin typeface="+mn-ea"/>
+              </a:rPr>
+              <a:t>[</a:t>
+            </a:r>
+            <a:r>
+              <a:rPr lang="en-US" altLang="ko-KR" sz="1200" dirty="0" err="1">
+                <a:latin typeface="+mn-ea"/>
+              </a:rPr>
+              <a:t>sudo</a:t>
+            </a:r>
+            <a:r>
+              <a:rPr lang="en-US" altLang="ko-KR" sz="1200" dirty="0">
+                <a:latin typeface="+mn-ea"/>
+              </a:rPr>
+              <a:t>] </a:t>
+            </a:r>
+            <a:r>
+              <a:rPr lang="en-US" altLang="ko-KR" sz="1200" dirty="0" err="1">
+                <a:latin typeface="+mn-ea"/>
+              </a:rPr>
+              <a:t>ahncy</a:t>
+            </a:r>
+            <a:r>
+              <a:rPr lang="en-US" altLang="ko-KR" sz="1200" dirty="0">
+                <a:latin typeface="+mn-ea"/>
+              </a:rPr>
+              <a:t> </a:t>
+            </a:r>
+            <a:r>
+              <a:rPr lang="ko-KR" altLang="en-US" sz="1200" dirty="0">
+                <a:latin typeface="+mn-ea"/>
+              </a:rPr>
+              <a:t>암호</a:t>
+            </a:r>
+            <a:r>
+              <a:rPr lang="en-US" altLang="ko-KR" sz="1200" dirty="0">
+                <a:latin typeface="+mn-ea"/>
+              </a:rPr>
+              <a:t>:</a:t>
+            </a:r>
+          </a:p>
+          <a:p>
+            <a:r>
+              <a:rPr lang="en-US" altLang="ko-KR" sz="1200" dirty="0">
+                <a:latin typeface="+mn-ea"/>
+              </a:rPr>
+              <a:t>root</a:t>
+            </a:r>
+          </a:p>
+        </p:txBody>
+      </p:sp>
+      <p:sp>
+        <p:nvSpPr>
+          <p:cNvPr id="6" name="TextBox 5"/>
+          <p:cNvSpPr txBox="1"/>
+          <p:nvPr/>
+        </p:nvSpPr>
+        <p:spPr>
+          <a:xfrm>
+            <a:off x="6238691" y="1178540"/>
+            <a:ext cx="5152767" cy="3108543"/>
+          </a:xfrm>
+          <a:prstGeom prst="rect">
+            <a:avLst/>
+          </a:prstGeom>
+          <a:noFill/>
+        </p:spPr>
+        <p:txBody>
+          <a:bodyPr wrap="square" rtlCol="0">
+            <a:spAutoFit/>
+          </a:bodyPr>
+          <a:lstStyle/>
+          <a:p>
+            <a:r>
+              <a:rPr lang="en-US" altLang="ko-KR" sz="1600" b="1" dirty="0" err="1" smtClean="0">
+                <a:latin typeface="+mn-ea"/>
+              </a:rPr>
+              <a:t>Mysql</a:t>
+            </a:r>
+            <a:r>
+              <a:rPr lang="en-US" altLang="ko-KR" sz="1600" b="1" dirty="0" smtClean="0">
+                <a:latin typeface="+mn-ea"/>
+              </a:rPr>
+              <a:t> </a:t>
+            </a:r>
+            <a:r>
+              <a:rPr lang="ko-KR" altLang="en-US" sz="1600" b="1" dirty="0" smtClean="0">
+                <a:latin typeface="+mn-ea"/>
+              </a:rPr>
+              <a:t>설치를 위한 준비</a:t>
+            </a:r>
+            <a:endParaRPr lang="en-US" altLang="ko-KR" sz="1600" b="1" dirty="0" smtClean="0">
+              <a:latin typeface="+mn-ea"/>
+            </a:endParaRPr>
+          </a:p>
+          <a:p>
+            <a:endParaRPr lang="en-US" altLang="ko-KR" sz="1200" dirty="0">
+              <a:latin typeface="+mn-ea"/>
+            </a:endParaRPr>
+          </a:p>
+          <a:p>
+            <a:r>
+              <a:rPr lang="ko-KR" altLang="en-US" sz="1200" dirty="0" smtClean="0">
+                <a:latin typeface="+mn-ea"/>
+              </a:rPr>
+              <a:t>최신 패키지 목록을 다운로드하여 업데이트</a:t>
+            </a:r>
+            <a:endParaRPr lang="en-US" altLang="ko-KR" sz="1200" dirty="0" smtClean="0">
+              <a:latin typeface="+mn-ea"/>
+            </a:endParaRPr>
+          </a:p>
+          <a:p>
+            <a:r>
+              <a:rPr lang="en-US" altLang="ko-KR" sz="1200" dirty="0" smtClean="0">
+                <a:latin typeface="+mn-ea"/>
+              </a:rPr>
+              <a:t>(</a:t>
+            </a:r>
+            <a:r>
+              <a:rPr lang="ko-KR" altLang="en-US" sz="1200" dirty="0" smtClean="0">
+                <a:latin typeface="+mn-ea"/>
+              </a:rPr>
+              <a:t>이때 이미 설치된 패키지는 변경되지 않음</a:t>
+            </a:r>
+            <a:r>
+              <a:rPr lang="en-US" altLang="ko-KR" sz="1200" dirty="0" smtClean="0">
+                <a:latin typeface="+mn-ea"/>
+              </a:rPr>
+              <a:t>)</a:t>
+            </a:r>
+          </a:p>
+          <a:p>
+            <a:r>
+              <a:rPr lang="en-US" altLang="ko-KR" sz="1200" dirty="0">
+                <a:latin typeface="+mn-ea"/>
+              </a:rPr>
+              <a:t>ahncy@sixtick-sub2:~$ </a:t>
+            </a:r>
+            <a:r>
+              <a:rPr lang="en-US" altLang="ko-KR" sz="1200" dirty="0" err="1">
+                <a:latin typeface="+mn-ea"/>
+              </a:rPr>
+              <a:t>sudo</a:t>
+            </a:r>
+            <a:r>
+              <a:rPr lang="en-US" altLang="ko-KR" sz="1200" dirty="0">
+                <a:latin typeface="+mn-ea"/>
+              </a:rPr>
+              <a:t> apt </a:t>
+            </a:r>
+            <a:r>
+              <a:rPr lang="en-US" altLang="ko-KR" sz="1200" dirty="0" smtClean="0">
+                <a:latin typeface="+mn-ea"/>
+              </a:rPr>
+              <a:t>update</a:t>
+            </a:r>
+          </a:p>
+          <a:p>
+            <a:endParaRPr lang="en-US" altLang="ko-KR" sz="1200" dirty="0">
+              <a:latin typeface="+mn-ea"/>
+            </a:endParaRPr>
+          </a:p>
+          <a:p>
+            <a:r>
+              <a:rPr lang="ko-KR" altLang="en-US" sz="1200" dirty="0" smtClean="0">
+                <a:latin typeface="+mn-ea"/>
+              </a:rPr>
+              <a:t>이미 설치된 패키지를 최신 버전으로 업데이트</a:t>
+            </a:r>
+            <a:endParaRPr lang="en-US" altLang="ko-KR" sz="1200" dirty="0" smtClean="0">
+              <a:latin typeface="+mn-ea"/>
+            </a:endParaRPr>
+          </a:p>
+          <a:p>
+            <a:r>
+              <a:rPr lang="en-US" altLang="ko-KR" sz="1200" dirty="0">
+                <a:latin typeface="+mn-ea"/>
+              </a:rPr>
+              <a:t>ahncy@sixtick-sub2:~$ </a:t>
+            </a:r>
+            <a:r>
+              <a:rPr lang="en-US" altLang="ko-KR" sz="1200" dirty="0" err="1">
+                <a:latin typeface="+mn-ea"/>
+              </a:rPr>
+              <a:t>sudo</a:t>
+            </a:r>
+            <a:r>
+              <a:rPr lang="en-US" altLang="ko-KR" sz="1200" dirty="0">
+                <a:latin typeface="+mn-ea"/>
+              </a:rPr>
+              <a:t> apt </a:t>
+            </a:r>
+            <a:r>
+              <a:rPr lang="en-US" altLang="ko-KR" sz="1200" dirty="0" smtClean="0">
+                <a:latin typeface="+mn-ea"/>
+              </a:rPr>
+              <a:t>upgrade</a:t>
+            </a:r>
+          </a:p>
+          <a:p>
+            <a:endParaRPr lang="en-US" altLang="ko-KR" sz="1200" dirty="0">
+              <a:latin typeface="+mn-ea"/>
+            </a:endParaRPr>
+          </a:p>
+          <a:p>
+            <a:r>
+              <a:rPr lang="en-US" altLang="ko-KR" sz="1200" dirty="0" err="1" smtClean="0">
+                <a:latin typeface="+mn-ea"/>
+              </a:rPr>
+              <a:t>Mysql</a:t>
+            </a:r>
+            <a:r>
+              <a:rPr lang="en-US" altLang="ko-KR" sz="1200" dirty="0" smtClean="0">
+                <a:latin typeface="+mn-ea"/>
+              </a:rPr>
+              <a:t> </a:t>
+            </a:r>
+            <a:r>
+              <a:rPr lang="ko-KR" altLang="en-US" sz="1200" dirty="0" smtClean="0">
+                <a:latin typeface="+mn-ea"/>
+              </a:rPr>
+              <a:t>설치</a:t>
+            </a:r>
+            <a:endParaRPr lang="en-US" altLang="ko-KR" sz="1200" dirty="0" smtClean="0">
+              <a:latin typeface="+mn-ea"/>
+            </a:endParaRPr>
+          </a:p>
+          <a:p>
+            <a:r>
+              <a:rPr lang="en-US" altLang="ko-KR" sz="1200" dirty="0">
+                <a:latin typeface="+mn-ea"/>
+              </a:rPr>
+              <a:t>ahncy@sixtick-sub2:~$ </a:t>
+            </a:r>
+            <a:r>
+              <a:rPr lang="en-US" altLang="ko-KR" sz="1200" dirty="0" err="1">
+                <a:latin typeface="+mn-ea"/>
+              </a:rPr>
+              <a:t>sudo</a:t>
+            </a:r>
+            <a:r>
+              <a:rPr lang="en-US" altLang="ko-KR" sz="1200" dirty="0">
+                <a:latin typeface="+mn-ea"/>
+              </a:rPr>
+              <a:t> apt install </a:t>
+            </a:r>
+            <a:r>
+              <a:rPr lang="en-US" altLang="ko-KR" sz="1200" dirty="0" err="1" smtClean="0">
+                <a:latin typeface="+mn-ea"/>
+              </a:rPr>
+              <a:t>mysql</a:t>
+            </a:r>
+            <a:r>
+              <a:rPr lang="en-US" altLang="ko-KR" sz="1200" dirty="0" smtClean="0">
+                <a:latin typeface="+mn-ea"/>
+              </a:rPr>
+              <a:t>-server</a:t>
+            </a:r>
+          </a:p>
+          <a:p>
+            <a:endParaRPr lang="en-US" altLang="ko-KR" sz="1200" dirty="0">
+              <a:latin typeface="+mn-ea"/>
+            </a:endParaRPr>
+          </a:p>
+          <a:p>
+            <a:r>
+              <a:rPr lang="ko-KR" altLang="en-US" sz="1200" dirty="0" smtClean="0">
+                <a:latin typeface="+mn-ea"/>
+              </a:rPr>
+              <a:t>설치 점검</a:t>
+            </a:r>
+            <a:endParaRPr lang="en-US" altLang="ko-KR" sz="1200" dirty="0" smtClean="0">
+              <a:latin typeface="+mn-ea"/>
+            </a:endParaRPr>
+          </a:p>
+          <a:p>
+            <a:r>
+              <a:rPr lang="en-US" altLang="ko-KR" sz="1200" dirty="0">
+                <a:latin typeface="+mn-ea"/>
+              </a:rPr>
+              <a:t>ahncy@sixtick-sub2:~$ </a:t>
+            </a:r>
+            <a:r>
+              <a:rPr lang="en-US" altLang="ko-KR" sz="1200" dirty="0" err="1">
+                <a:latin typeface="+mn-ea"/>
+              </a:rPr>
+              <a:t>mysql</a:t>
+            </a:r>
+            <a:r>
+              <a:rPr lang="en-US" altLang="ko-KR" sz="1200" dirty="0">
+                <a:latin typeface="+mn-ea"/>
+              </a:rPr>
+              <a:t> --version</a:t>
+            </a:r>
+          </a:p>
+          <a:p>
+            <a:r>
+              <a:rPr lang="en-US" altLang="ko-KR" sz="1200" dirty="0" err="1">
+                <a:latin typeface="+mn-ea"/>
+              </a:rPr>
+              <a:t>mysql</a:t>
+            </a:r>
+            <a:r>
+              <a:rPr lang="en-US" altLang="ko-KR" sz="1200" dirty="0">
+                <a:latin typeface="+mn-ea"/>
+              </a:rPr>
+              <a:t>  </a:t>
+            </a:r>
+            <a:r>
+              <a:rPr lang="en-US" altLang="ko-KR" sz="1200" dirty="0" err="1">
+                <a:latin typeface="+mn-ea"/>
+              </a:rPr>
+              <a:t>Ver</a:t>
+            </a:r>
+            <a:r>
+              <a:rPr lang="en-US" altLang="ko-KR" sz="1200" dirty="0">
+                <a:latin typeface="+mn-ea"/>
+              </a:rPr>
+              <a:t> 8.0.40-0ubuntu0.24.04.1 for Linux on x86_64 ((Ubuntu))</a:t>
+            </a:r>
+          </a:p>
+        </p:txBody>
+      </p:sp>
+    </p:spTree>
+    <p:extLst>
+      <p:ext uri="{BB962C8B-B14F-4D97-AF65-F5344CB8AC3E}">
+        <p14:creationId xmlns:p14="http://schemas.microsoft.com/office/powerpoint/2010/main" val="1357353633"/>
+      </p:ext>
+    </p:extLst>
+  </p:cSld>
+  <p:clrMapOvr>
+    <a:masterClrMapping/>
+  </p:clrMapOvr>
+</p:sld>
+</file>
+
+<file path=ppt/slides/slide9.xml><?xml version="1.0" encoding="utf-8"?>
+<p:sld xmlns:a="http://schemas.openxmlformats.org/drawingml/2006/main" xmlns:r="http://schemas.openxmlformats.org/officeDocument/2006/relationships" xmlns:p="http://schemas.openxmlformats.org/presentationml/2006/main">
+  <p:cSld>
+    <p:spTree>
+      <p:nvGrpSpPr>
+        <p:cNvPr id="1" name=""/>
+        <p:cNvGrpSpPr/>
+        <p:nvPr/>
+      </p:nvGrpSpPr>
+      <p:grpSpPr>
+        <a:xfrm>
+          <a:off x="0" y="0"/>
+          <a:ext cx="0" cy="0"/>
+          <a:chOff x="0" y="0"/>
+          <a:chExt cx="0" cy="0"/>
+        </a:xfrm>
+      </p:grpSpPr>
+      <p:sp>
+        <p:nvSpPr>
+          <p:cNvPr id="2" name="TextBox 1"/>
+          <p:cNvSpPr txBox="1"/>
+          <p:nvPr/>
+        </p:nvSpPr>
+        <p:spPr>
+          <a:xfrm>
+            <a:off x="9127221" y="201336"/>
+            <a:ext cx="2509020" cy="584775"/>
+          </a:xfrm>
+          <a:prstGeom prst="rect">
+            <a:avLst/>
+          </a:prstGeom>
+          <a:noFill/>
+        </p:spPr>
+        <p:txBody>
+          <a:bodyPr wrap="none" rtlCol="0">
+            <a:spAutoFit/>
+          </a:bodyPr>
+          <a:lstStyle/>
+          <a:p>
+            <a:pPr algn="r"/>
+            <a:r>
+              <a:rPr lang="en-US" altLang="ko-KR" sz="3200" dirty="0" smtClean="0">
+                <a:solidFill>
+                  <a:schemeClr val="bg1"/>
+                </a:solidFill>
+              </a:rPr>
+              <a:t>DB </a:t>
+            </a:r>
+            <a:r>
+              <a:rPr lang="ko-KR" altLang="en-US" sz="3200" dirty="0" smtClean="0">
+                <a:solidFill>
+                  <a:schemeClr val="bg1"/>
+                </a:solidFill>
+              </a:rPr>
+              <a:t>서버 구축</a:t>
+            </a:r>
+            <a:endParaRPr lang="ko-KR" altLang="en-US" sz="3200" dirty="0">
+              <a:solidFill>
+                <a:schemeClr val="bg1"/>
+              </a:solidFill>
+            </a:endParaRPr>
+          </a:p>
+        </p:txBody>
+      </p:sp>
+      <p:sp>
+        <p:nvSpPr>
+          <p:cNvPr id="3" name="TextBox 2"/>
+          <p:cNvSpPr txBox="1"/>
+          <p:nvPr/>
+        </p:nvSpPr>
+        <p:spPr>
+          <a:xfrm>
+            <a:off x="4683211" y="2063578"/>
+            <a:ext cx="184731" cy="369332"/>
+          </a:xfrm>
+          <a:prstGeom prst="rect">
+            <a:avLst/>
+          </a:prstGeom>
+          <a:noFill/>
+        </p:spPr>
+        <p:txBody>
+          <a:bodyPr wrap="none" rtlCol="0">
+            <a:spAutoFit/>
+          </a:bodyPr>
+          <a:lstStyle/>
+          <a:p>
+            <a:endParaRPr lang="ko-KR" altLang="en-US" dirty="0"/>
+          </a:p>
+        </p:txBody>
+      </p:sp>
+      <p:sp>
+        <p:nvSpPr>
+          <p:cNvPr id="4" name="TextBox 3"/>
+          <p:cNvSpPr txBox="1"/>
+          <p:nvPr/>
+        </p:nvSpPr>
+        <p:spPr>
+          <a:xfrm>
+            <a:off x="4683211" y="1606378"/>
+            <a:ext cx="45719" cy="369332"/>
+          </a:xfrm>
+          <a:prstGeom prst="rect">
+            <a:avLst/>
+          </a:prstGeom>
+          <a:noFill/>
+        </p:spPr>
+        <p:txBody>
+          <a:bodyPr wrap="square" rtlCol="0">
+            <a:spAutoFit/>
+          </a:bodyPr>
+          <a:lstStyle/>
+          <a:p>
+            <a:endParaRPr lang="ko-KR" altLang="en-US" dirty="0"/>
+          </a:p>
+        </p:txBody>
+      </p:sp>
+      <p:sp>
+        <p:nvSpPr>
+          <p:cNvPr id="5" name="TextBox 4"/>
+          <p:cNvSpPr txBox="1"/>
+          <p:nvPr/>
+        </p:nvSpPr>
+        <p:spPr>
+          <a:xfrm>
+            <a:off x="815999" y="1149178"/>
+            <a:ext cx="5152767" cy="4585871"/>
+          </a:xfrm>
+          <a:prstGeom prst="rect">
+            <a:avLst/>
+          </a:prstGeom>
+          <a:noFill/>
+        </p:spPr>
+        <p:txBody>
+          <a:bodyPr wrap="square" rtlCol="0">
+            <a:spAutoFit/>
+          </a:bodyPr>
+          <a:lstStyle/>
+          <a:p>
+            <a:r>
+              <a:rPr lang="ko-KR" altLang="en-US" sz="1600" b="1" dirty="0" smtClean="0">
+                <a:latin typeface="+mn-ea"/>
+              </a:rPr>
+              <a:t>외부에서 </a:t>
+            </a:r>
+            <a:r>
+              <a:rPr lang="en-US" altLang="ko-KR" sz="1600" b="1" dirty="0" err="1" smtClean="0">
+                <a:latin typeface="+mn-ea"/>
+              </a:rPr>
+              <a:t>mysql</a:t>
+            </a:r>
+            <a:r>
+              <a:rPr lang="ko-KR" altLang="en-US" sz="1600" b="1" dirty="0" smtClean="0">
+                <a:latin typeface="+mn-ea"/>
+              </a:rPr>
+              <a:t>에 접속 가능하도록 설정</a:t>
+            </a:r>
+            <a:endParaRPr lang="en-US" altLang="ko-KR" sz="1600" b="1" dirty="0" smtClean="0">
+              <a:latin typeface="+mn-ea"/>
+            </a:endParaRPr>
+          </a:p>
+          <a:p>
+            <a:endParaRPr lang="en-US" altLang="ko-KR" sz="1200" dirty="0" smtClean="0">
+              <a:latin typeface="+mn-ea"/>
+            </a:endParaRPr>
+          </a:p>
+          <a:p>
+            <a:r>
+              <a:rPr lang="en-US" altLang="ko-KR" sz="1200" dirty="0" err="1" smtClean="0">
+                <a:latin typeface="+mn-ea"/>
+              </a:rPr>
+              <a:t>Mysql</a:t>
+            </a:r>
+            <a:r>
+              <a:rPr lang="en-US" altLang="ko-KR" sz="1200" dirty="0" smtClean="0">
+                <a:latin typeface="+mn-ea"/>
+              </a:rPr>
+              <a:t> </a:t>
+            </a:r>
+            <a:r>
+              <a:rPr lang="ko-KR" altLang="en-US" sz="1200" dirty="0" smtClean="0">
+                <a:latin typeface="+mn-ea"/>
+              </a:rPr>
+              <a:t>서버의 설정 파일 편집</a:t>
+            </a:r>
+            <a:endParaRPr lang="en-US" altLang="ko-KR" sz="1200" dirty="0">
+              <a:latin typeface="+mn-ea"/>
+            </a:endParaRPr>
+          </a:p>
+          <a:p>
+            <a:r>
+              <a:rPr lang="en-US" altLang="ko-KR" sz="1200" dirty="0">
+                <a:latin typeface="+mn-ea"/>
+              </a:rPr>
+              <a:t>ahncy@sixtick-sub2:~$ </a:t>
+            </a:r>
+            <a:r>
+              <a:rPr lang="en-US" altLang="ko-KR" sz="1200" dirty="0" err="1">
+                <a:latin typeface="+mn-ea"/>
+              </a:rPr>
+              <a:t>sudo</a:t>
+            </a:r>
+            <a:r>
+              <a:rPr lang="en-US" altLang="ko-KR" sz="1200" dirty="0">
+                <a:latin typeface="+mn-ea"/>
+              </a:rPr>
+              <a:t> </a:t>
+            </a:r>
+            <a:r>
+              <a:rPr lang="en-US" altLang="ko-KR" sz="1200" dirty="0" err="1">
+                <a:latin typeface="+mn-ea"/>
+              </a:rPr>
+              <a:t>nano</a:t>
+            </a:r>
+            <a:r>
+              <a:rPr lang="en-US" altLang="ko-KR" sz="1200" dirty="0">
+                <a:latin typeface="+mn-ea"/>
+              </a:rPr>
+              <a:t> /</a:t>
+            </a:r>
+            <a:r>
+              <a:rPr lang="en-US" altLang="ko-KR" sz="1200" dirty="0" err="1">
+                <a:latin typeface="+mn-ea"/>
+              </a:rPr>
+              <a:t>etc</a:t>
+            </a:r>
+            <a:r>
+              <a:rPr lang="en-US" altLang="ko-KR" sz="1200" dirty="0">
+                <a:latin typeface="+mn-ea"/>
+              </a:rPr>
+              <a:t>/</a:t>
+            </a:r>
+            <a:r>
+              <a:rPr lang="en-US" altLang="ko-KR" sz="1200" dirty="0" err="1">
+                <a:latin typeface="+mn-ea"/>
+              </a:rPr>
+              <a:t>mysql</a:t>
+            </a:r>
+            <a:r>
+              <a:rPr lang="en-US" altLang="ko-KR" sz="1200" dirty="0">
+                <a:latin typeface="+mn-ea"/>
+              </a:rPr>
+              <a:t>/</a:t>
+            </a:r>
+            <a:r>
+              <a:rPr lang="en-US" altLang="ko-KR" sz="1200" dirty="0" err="1">
+                <a:latin typeface="+mn-ea"/>
+              </a:rPr>
+              <a:t>mysql.conf.d</a:t>
+            </a:r>
+            <a:r>
+              <a:rPr lang="en-US" altLang="ko-KR" sz="1200" dirty="0">
+                <a:latin typeface="+mn-ea"/>
+              </a:rPr>
+              <a:t>/</a:t>
+            </a:r>
+            <a:r>
+              <a:rPr lang="en-US" altLang="ko-KR" sz="1200" dirty="0" err="1">
+                <a:latin typeface="+mn-ea"/>
+              </a:rPr>
+              <a:t>mysqld.cnf</a:t>
+            </a:r>
+            <a:endParaRPr lang="en-US" altLang="ko-KR" sz="1200" dirty="0" smtClean="0">
+              <a:latin typeface="+mn-ea"/>
+            </a:endParaRPr>
+          </a:p>
+          <a:p>
+            <a:endParaRPr lang="en-US" altLang="ko-KR" sz="1200" dirty="0">
+              <a:latin typeface="+mn-ea"/>
+            </a:endParaRPr>
+          </a:p>
+          <a:p>
+            <a:r>
+              <a:rPr lang="ko-KR" altLang="en-US" sz="1200" dirty="0" smtClean="0">
+                <a:latin typeface="+mn-ea"/>
+              </a:rPr>
+              <a:t>모든 외부 </a:t>
+            </a:r>
+            <a:r>
+              <a:rPr lang="en-US" altLang="ko-KR" sz="1200" dirty="0" smtClean="0">
+                <a:latin typeface="+mn-ea"/>
+              </a:rPr>
+              <a:t>IP</a:t>
+            </a:r>
+            <a:r>
+              <a:rPr lang="ko-KR" altLang="en-US" sz="1200" dirty="0" smtClean="0">
+                <a:latin typeface="+mn-ea"/>
+              </a:rPr>
+              <a:t>에서 접속할 수 있도록 </a:t>
+            </a:r>
+            <a:r>
+              <a:rPr lang="en-US" altLang="ko-KR" sz="1200" dirty="0" smtClean="0">
+                <a:latin typeface="+mn-ea"/>
+              </a:rPr>
+              <a:t>bind-address </a:t>
+            </a:r>
+            <a:r>
+              <a:rPr lang="ko-KR" altLang="en-US" sz="1200" dirty="0" smtClean="0">
+                <a:latin typeface="+mn-ea"/>
+              </a:rPr>
+              <a:t>수정</a:t>
+            </a:r>
+            <a:endParaRPr lang="en-US" altLang="ko-KR" sz="1200" dirty="0" smtClean="0">
+              <a:latin typeface="+mn-ea"/>
+            </a:endParaRPr>
+          </a:p>
+          <a:p>
+            <a:r>
+              <a:rPr lang="en-US" altLang="ko-KR" sz="1200" dirty="0">
+                <a:latin typeface="+mn-ea"/>
+              </a:rPr>
+              <a:t>bind-address = </a:t>
+            </a:r>
+            <a:r>
+              <a:rPr lang="en-US" altLang="ko-KR" sz="1200" dirty="0" smtClean="0">
+                <a:latin typeface="+mn-ea"/>
+              </a:rPr>
+              <a:t>127.0.0.1 </a:t>
+            </a:r>
+            <a:r>
+              <a:rPr lang="en-US" altLang="ko-KR" sz="1200" dirty="0" smtClean="0">
+                <a:latin typeface="+mn-ea"/>
+                <a:sym typeface="Wingdings" panose="05000000000000000000" pitchFamily="2" charset="2"/>
+              </a:rPr>
+              <a:t> </a:t>
+            </a:r>
+            <a:r>
+              <a:rPr lang="en-US" altLang="ko-KR" sz="1200" dirty="0">
+                <a:latin typeface="+mn-ea"/>
+              </a:rPr>
+              <a:t>bind-address = </a:t>
+            </a:r>
+            <a:r>
+              <a:rPr lang="en-US" altLang="ko-KR" sz="1200" dirty="0" smtClean="0">
+                <a:latin typeface="+mn-ea"/>
+              </a:rPr>
+              <a:t>0.0.0.0</a:t>
+            </a:r>
+          </a:p>
+          <a:p>
+            <a:endParaRPr lang="en-US" altLang="ko-KR" sz="1200" dirty="0" smtClean="0">
+              <a:latin typeface="+mn-ea"/>
+            </a:endParaRPr>
+          </a:p>
+          <a:p>
+            <a:r>
+              <a:rPr lang="ko-KR" altLang="en-US" sz="1200" dirty="0" smtClean="0">
+                <a:latin typeface="+mn-ea"/>
+              </a:rPr>
+              <a:t>설정을 반영하기 위해 </a:t>
+            </a:r>
+            <a:r>
+              <a:rPr lang="ko-KR" altLang="en-US" sz="1200" dirty="0" err="1" smtClean="0">
+                <a:latin typeface="+mn-ea"/>
+              </a:rPr>
+              <a:t>재시작</a:t>
+            </a:r>
+            <a:endParaRPr lang="en-US" altLang="ko-KR" sz="1200" dirty="0">
+              <a:latin typeface="+mn-ea"/>
+            </a:endParaRPr>
+          </a:p>
+          <a:p>
+            <a:r>
+              <a:rPr lang="en-US" altLang="ko-KR" sz="1200" dirty="0" err="1">
+                <a:latin typeface="+mn-ea"/>
+              </a:rPr>
+              <a:t>sudo</a:t>
+            </a:r>
+            <a:r>
+              <a:rPr lang="en-US" altLang="ko-KR" sz="1200" dirty="0">
+                <a:latin typeface="+mn-ea"/>
+              </a:rPr>
+              <a:t> </a:t>
+            </a:r>
+            <a:r>
+              <a:rPr lang="en-US" altLang="ko-KR" sz="1200" dirty="0" err="1">
+                <a:latin typeface="+mn-ea"/>
+              </a:rPr>
+              <a:t>systemctl</a:t>
+            </a:r>
+            <a:r>
+              <a:rPr lang="en-US" altLang="ko-KR" sz="1200" dirty="0">
+                <a:latin typeface="+mn-ea"/>
+              </a:rPr>
+              <a:t> restart </a:t>
+            </a:r>
+            <a:r>
+              <a:rPr lang="en-US" altLang="ko-KR" sz="1200" dirty="0" err="1">
+                <a:latin typeface="+mn-ea"/>
+              </a:rPr>
+              <a:t>mysql</a:t>
+            </a:r>
+            <a:endParaRPr lang="en-US" altLang="ko-KR" sz="1200" dirty="0">
+              <a:latin typeface="+mn-ea"/>
+            </a:endParaRPr>
+          </a:p>
+          <a:p>
+            <a:endParaRPr lang="en-US" altLang="ko-KR" sz="1200" dirty="0" smtClean="0">
+              <a:latin typeface="+mn-ea"/>
+            </a:endParaRPr>
+          </a:p>
+          <a:p>
+            <a:r>
+              <a:rPr lang="ko-KR" altLang="en-US" sz="1200" dirty="0" smtClean="0">
+                <a:latin typeface="+mn-ea"/>
+              </a:rPr>
+              <a:t>외부 사용자 생성과 모든 외부 </a:t>
+            </a:r>
+            <a:r>
+              <a:rPr lang="en-US" altLang="ko-KR" sz="1200" dirty="0" smtClean="0">
+                <a:latin typeface="+mn-ea"/>
+              </a:rPr>
+              <a:t>IP </a:t>
+            </a:r>
+            <a:r>
+              <a:rPr lang="ko-KR" altLang="en-US" sz="1200" dirty="0" smtClean="0">
+                <a:latin typeface="+mn-ea"/>
+              </a:rPr>
+              <a:t>주소의 접속을 허용</a:t>
+            </a:r>
+            <a:endParaRPr lang="en-US" altLang="ko-KR" sz="1200" dirty="0" smtClean="0">
+              <a:latin typeface="+mn-ea"/>
+            </a:endParaRPr>
+          </a:p>
+          <a:p>
+            <a:r>
+              <a:rPr lang="en-US" altLang="ko-KR" sz="1200" dirty="0" err="1" smtClean="0">
+                <a:latin typeface="+mn-ea"/>
+              </a:rPr>
+              <a:t>Mysql</a:t>
+            </a:r>
+            <a:r>
+              <a:rPr lang="en-US" altLang="ko-KR" sz="1200" dirty="0">
+                <a:latin typeface="+mn-ea"/>
+              </a:rPr>
+              <a:t>&gt; CREATE USER </a:t>
+            </a:r>
+            <a:r>
+              <a:rPr lang="en-US" altLang="ko-KR" sz="1200" dirty="0" smtClean="0">
+                <a:latin typeface="+mn-ea"/>
+              </a:rPr>
+              <a:t>＇</a:t>
+            </a:r>
+            <a:r>
+              <a:rPr lang="en-US" altLang="ko-KR" sz="1200" dirty="0" err="1" smtClean="0">
+                <a:latin typeface="+mn-ea"/>
+              </a:rPr>
+              <a:t>ahncho</a:t>
+            </a:r>
+            <a:r>
+              <a:rPr lang="en-US" altLang="ko-KR" sz="1200" dirty="0" smtClean="0">
+                <a:latin typeface="+mn-ea"/>
+              </a:rPr>
+              <a:t>＇@＇%＇ </a:t>
+            </a:r>
+            <a:r>
+              <a:rPr lang="en-US" altLang="ko-KR" sz="1200" dirty="0">
+                <a:latin typeface="+mn-ea"/>
+              </a:rPr>
+              <a:t>IDENTIFIED BY </a:t>
+            </a:r>
+            <a:r>
+              <a:rPr lang="en-US" altLang="ko-KR" sz="1200" dirty="0" smtClean="0">
+                <a:latin typeface="+mn-ea"/>
+              </a:rPr>
+              <a:t>&lt;</a:t>
+            </a:r>
+            <a:r>
+              <a:rPr lang="en-US" altLang="ko-KR" sz="1200" dirty="0" err="1" smtClean="0">
+                <a:latin typeface="+mn-ea"/>
+              </a:rPr>
+              <a:t>passwd</a:t>
+            </a:r>
+            <a:r>
+              <a:rPr lang="en-US" altLang="ko-KR" sz="1200" dirty="0" smtClean="0">
+                <a:latin typeface="+mn-ea"/>
+              </a:rPr>
+              <a:t>&gt;;</a:t>
+            </a:r>
+            <a:endParaRPr lang="en-US" altLang="ko-KR" sz="1200" dirty="0">
+              <a:latin typeface="+mn-ea"/>
+            </a:endParaRPr>
+          </a:p>
+          <a:p>
+            <a:r>
+              <a:rPr lang="en-US" altLang="ko-KR" sz="1200" dirty="0">
+                <a:latin typeface="+mn-ea"/>
+              </a:rPr>
+              <a:t>Query OK, 0 rows affected (0.02 sec)</a:t>
+            </a:r>
+          </a:p>
+          <a:p>
+            <a:endParaRPr lang="en-US" altLang="ko-KR" sz="1200" dirty="0" smtClean="0">
+              <a:latin typeface="+mn-ea"/>
+            </a:endParaRPr>
+          </a:p>
+          <a:p>
+            <a:r>
+              <a:rPr lang="en-US" altLang="ko-KR" sz="1200" dirty="0" err="1" smtClean="0">
+                <a:latin typeface="+mn-ea"/>
+              </a:rPr>
+              <a:t>Ahncho</a:t>
+            </a:r>
+            <a:r>
+              <a:rPr lang="ko-KR" altLang="en-US" sz="1200" dirty="0" smtClean="0">
+                <a:latin typeface="+mn-ea"/>
+              </a:rPr>
+              <a:t>라는 사용자에게 모든 권한 부여</a:t>
+            </a:r>
+            <a:endParaRPr lang="en-US" altLang="ko-KR" sz="1200" dirty="0">
+              <a:latin typeface="+mn-ea"/>
+            </a:endParaRPr>
+          </a:p>
+          <a:p>
+            <a:r>
+              <a:rPr lang="en-US" altLang="ko-KR" sz="1200" dirty="0" err="1">
+                <a:latin typeface="+mn-ea"/>
+              </a:rPr>
+              <a:t>mysql</a:t>
+            </a:r>
+            <a:r>
+              <a:rPr lang="en-US" altLang="ko-KR" sz="1200" dirty="0">
+                <a:latin typeface="+mn-ea"/>
+              </a:rPr>
+              <a:t>&gt; GRANT ALL PRIVILEGES ON *.* TO '</a:t>
+            </a:r>
+            <a:r>
+              <a:rPr lang="en-US" altLang="ko-KR" sz="1200" dirty="0" err="1">
+                <a:latin typeface="+mn-ea"/>
+              </a:rPr>
+              <a:t>ahncho</a:t>
+            </a:r>
+            <a:r>
+              <a:rPr lang="en-US" altLang="ko-KR" sz="1200" dirty="0">
+                <a:latin typeface="+mn-ea"/>
+              </a:rPr>
+              <a:t>'@'%';</a:t>
+            </a:r>
+          </a:p>
+          <a:p>
+            <a:r>
+              <a:rPr lang="en-US" altLang="ko-KR" sz="1200" dirty="0">
+                <a:latin typeface="+mn-ea"/>
+              </a:rPr>
+              <a:t>Query OK, 0 rows affected (0.01 sec)</a:t>
+            </a:r>
+          </a:p>
+          <a:p>
+            <a:endParaRPr lang="en-US" altLang="ko-KR" sz="1200" dirty="0" smtClean="0">
+              <a:latin typeface="+mn-ea"/>
+            </a:endParaRPr>
+          </a:p>
+          <a:p>
+            <a:r>
+              <a:rPr lang="ko-KR" altLang="en-US" sz="1200" dirty="0" smtClean="0">
+                <a:latin typeface="+mn-ea"/>
+              </a:rPr>
+              <a:t>권한 설정을 즉시 반영</a:t>
+            </a:r>
+            <a:endParaRPr lang="en-US" altLang="ko-KR" sz="1200" dirty="0">
+              <a:latin typeface="+mn-ea"/>
+            </a:endParaRPr>
+          </a:p>
+          <a:p>
+            <a:r>
+              <a:rPr lang="en-US" altLang="ko-KR" sz="1200" dirty="0" err="1">
+                <a:latin typeface="+mn-ea"/>
+              </a:rPr>
+              <a:t>mysql</a:t>
+            </a:r>
+            <a:r>
+              <a:rPr lang="en-US" altLang="ko-KR" sz="1200" dirty="0">
+                <a:latin typeface="+mn-ea"/>
+              </a:rPr>
+              <a:t>&gt; FLUSH PRIVILEGES;</a:t>
+            </a:r>
+          </a:p>
+          <a:p>
+            <a:r>
+              <a:rPr lang="en-US" altLang="ko-KR" sz="1200" dirty="0">
+                <a:latin typeface="+mn-ea"/>
+              </a:rPr>
+              <a:t>Query OK, 0 rows affected (0.01 sec)</a:t>
+            </a:r>
+          </a:p>
+        </p:txBody>
+      </p:sp>
+      <p:sp>
+        <p:nvSpPr>
+          <p:cNvPr id="6" name="TextBox 5"/>
+          <p:cNvSpPr txBox="1"/>
+          <p:nvPr/>
+        </p:nvSpPr>
+        <p:spPr>
+          <a:xfrm>
+            <a:off x="6158770" y="1149178"/>
+            <a:ext cx="5152767" cy="4770537"/>
+          </a:xfrm>
+          <a:prstGeom prst="rect">
+            <a:avLst/>
+          </a:prstGeom>
+          <a:noFill/>
+        </p:spPr>
+        <p:txBody>
+          <a:bodyPr wrap="square" rtlCol="0">
+            <a:spAutoFit/>
+          </a:bodyPr>
+          <a:lstStyle/>
+          <a:p>
+            <a:r>
+              <a:rPr lang="ko-KR" altLang="en-US" sz="1600" b="1" dirty="0" smtClean="0">
+                <a:latin typeface="+mn-ea"/>
+              </a:rPr>
+              <a:t>외부에서 </a:t>
+            </a:r>
+            <a:r>
+              <a:rPr lang="en-US" altLang="ko-KR" sz="1600" b="1" dirty="0" err="1" smtClean="0">
+                <a:latin typeface="+mn-ea"/>
+              </a:rPr>
+              <a:t>mysql</a:t>
+            </a:r>
+            <a:r>
+              <a:rPr lang="en-US" altLang="ko-KR" sz="1600" b="1" dirty="0" smtClean="0">
+                <a:latin typeface="+mn-ea"/>
+              </a:rPr>
+              <a:t> </a:t>
+            </a:r>
+            <a:r>
+              <a:rPr lang="ko-KR" altLang="en-US" sz="1600" b="1" dirty="0" smtClean="0">
+                <a:latin typeface="+mn-ea"/>
+              </a:rPr>
+              <a:t>접속 및 데이터베이스의 테이블 생성</a:t>
+            </a:r>
+            <a:endParaRPr lang="en-US" altLang="ko-KR" sz="1600" b="1" dirty="0" smtClean="0">
+              <a:latin typeface="+mn-ea"/>
+            </a:endParaRPr>
+          </a:p>
+          <a:p>
+            <a:endParaRPr lang="en-US" altLang="ko-KR" sz="1200" dirty="0" smtClean="0">
+              <a:latin typeface="+mn-ea"/>
+            </a:endParaRPr>
+          </a:p>
+          <a:p>
+            <a:r>
+              <a:rPr lang="ko-KR" altLang="en-US" sz="1200" dirty="0">
+                <a:latin typeface="+mn-ea"/>
+              </a:rPr>
+              <a:t>생성한 외부 사용자로 </a:t>
+            </a:r>
+            <a:r>
+              <a:rPr lang="en-US" altLang="ko-KR" sz="1200" dirty="0" err="1">
+                <a:latin typeface="+mn-ea"/>
+              </a:rPr>
+              <a:t>mysql</a:t>
+            </a:r>
+            <a:r>
+              <a:rPr lang="en-US" altLang="ko-KR" sz="1200" dirty="0">
+                <a:latin typeface="+mn-ea"/>
+              </a:rPr>
+              <a:t> </a:t>
+            </a:r>
+            <a:r>
+              <a:rPr lang="ko-KR" altLang="en-US" sz="1200" dirty="0" smtClean="0">
+                <a:latin typeface="+mn-ea"/>
+              </a:rPr>
+              <a:t>접속</a:t>
+            </a:r>
+            <a:endParaRPr lang="en-US" altLang="ko-KR" sz="1200" dirty="0">
+              <a:latin typeface="+mn-ea"/>
+            </a:endParaRPr>
+          </a:p>
+          <a:p>
+            <a:r>
+              <a:rPr lang="en-US" altLang="ko-KR" sz="1200" dirty="0" smtClean="0">
+                <a:latin typeface="+mn-ea"/>
+              </a:rPr>
+              <a:t>PS C:\Users\acy&gt; </a:t>
+            </a:r>
+            <a:r>
+              <a:rPr lang="en-US" altLang="ko-KR" sz="1200" dirty="0" err="1" smtClean="0">
+                <a:latin typeface="+mn-ea"/>
+              </a:rPr>
+              <a:t>mysql</a:t>
+            </a:r>
+            <a:r>
+              <a:rPr lang="en-US" altLang="ko-KR" sz="1200" dirty="0" smtClean="0">
+                <a:latin typeface="+mn-ea"/>
+              </a:rPr>
+              <a:t> –u </a:t>
+            </a:r>
+            <a:r>
+              <a:rPr lang="en-US" altLang="ko-KR" sz="1200" dirty="0" err="1" smtClean="0">
+                <a:latin typeface="+mn-ea"/>
+              </a:rPr>
+              <a:t>ahncho</a:t>
+            </a:r>
+            <a:r>
+              <a:rPr lang="en-US" altLang="ko-KR" sz="1200" dirty="0" smtClean="0">
+                <a:latin typeface="+mn-ea"/>
+              </a:rPr>
+              <a:t> –p –h 192.168.0.26 –P 3306</a:t>
+            </a:r>
+          </a:p>
+          <a:p>
+            <a:endParaRPr lang="en-US" altLang="ko-KR" sz="1200" dirty="0">
+              <a:latin typeface="+mn-ea"/>
+            </a:endParaRPr>
+          </a:p>
+          <a:p>
+            <a:r>
+              <a:rPr lang="ko-KR" altLang="en-US" sz="1200" dirty="0" smtClean="0">
+                <a:latin typeface="+mn-ea"/>
+              </a:rPr>
+              <a:t>데이터베이스 생성</a:t>
+            </a:r>
+            <a:endParaRPr lang="en-US" altLang="ko-KR" sz="1200" dirty="0" smtClean="0">
+              <a:latin typeface="+mn-ea"/>
+            </a:endParaRPr>
+          </a:p>
+          <a:p>
+            <a:r>
+              <a:rPr lang="en-US" altLang="ko-KR" sz="1200" dirty="0" err="1">
+                <a:latin typeface="+mn-ea"/>
+              </a:rPr>
+              <a:t>mysql</a:t>
+            </a:r>
+            <a:r>
+              <a:rPr lang="en-US" altLang="ko-KR" sz="1200" dirty="0">
+                <a:latin typeface="+mn-ea"/>
+              </a:rPr>
+              <a:t>&gt; create database movie</a:t>
+            </a:r>
+            <a:r>
+              <a:rPr lang="en-US" altLang="ko-KR" sz="1200" dirty="0" smtClean="0">
+                <a:latin typeface="+mn-ea"/>
+              </a:rPr>
+              <a:t>;</a:t>
+            </a:r>
+          </a:p>
+          <a:p>
+            <a:endParaRPr lang="en-US" altLang="ko-KR" sz="1200" dirty="0">
+              <a:latin typeface="+mn-ea"/>
+            </a:endParaRPr>
+          </a:p>
+          <a:p>
+            <a:r>
+              <a:rPr lang="ko-KR" altLang="en-US" sz="1200" dirty="0" smtClean="0">
+                <a:latin typeface="+mn-ea"/>
+              </a:rPr>
+              <a:t>해당 데이터베이스에서 테이블 생성</a:t>
+            </a:r>
+            <a:endParaRPr lang="en-US" altLang="ko-KR" sz="1200" dirty="0" smtClean="0">
+              <a:latin typeface="+mn-ea"/>
+            </a:endParaRPr>
+          </a:p>
+          <a:p>
+            <a:r>
+              <a:rPr lang="en-US" altLang="ko-KR" sz="1200" dirty="0" err="1" smtClean="0">
+                <a:latin typeface="+mn-ea"/>
+              </a:rPr>
+              <a:t>Mysql</a:t>
+            </a:r>
+            <a:r>
+              <a:rPr lang="en-US" altLang="ko-KR" sz="1200" dirty="0" smtClean="0">
+                <a:latin typeface="+mn-ea"/>
+              </a:rPr>
+              <a:t>&gt; create </a:t>
+            </a:r>
+            <a:r>
+              <a:rPr lang="en-US" altLang="ko-KR" sz="1200" dirty="0">
+                <a:latin typeface="+mn-ea"/>
+              </a:rPr>
+              <a:t>table posters </a:t>
+            </a:r>
+            <a:r>
+              <a:rPr lang="en-US" altLang="ko-KR" sz="1200" dirty="0" smtClean="0">
+                <a:latin typeface="+mn-ea"/>
+              </a:rPr>
+              <a:t>(</a:t>
+            </a:r>
+          </a:p>
+          <a:p>
+            <a:r>
+              <a:rPr lang="en-US" altLang="ko-KR" sz="1200" dirty="0">
+                <a:latin typeface="+mn-ea"/>
+              </a:rPr>
+              <a:t> </a:t>
+            </a:r>
+            <a:r>
+              <a:rPr lang="en-US" altLang="ko-KR" sz="1200" dirty="0" smtClean="0">
+                <a:latin typeface="+mn-ea"/>
+              </a:rPr>
+              <a:t>   id </a:t>
+            </a:r>
+            <a:r>
+              <a:rPr lang="en-US" altLang="ko-KR" sz="1200" dirty="0" err="1">
+                <a:latin typeface="+mn-ea"/>
+              </a:rPr>
+              <a:t>int</a:t>
+            </a:r>
+            <a:r>
+              <a:rPr lang="en-US" altLang="ko-KR" sz="1200" dirty="0">
+                <a:latin typeface="+mn-ea"/>
+              </a:rPr>
+              <a:t> auto-increment primary key</a:t>
+            </a:r>
+            <a:r>
+              <a:rPr lang="en-US" altLang="ko-KR" sz="1200" dirty="0" smtClean="0">
+                <a:latin typeface="+mn-ea"/>
+              </a:rPr>
+              <a:t>,</a:t>
+            </a:r>
+            <a:endParaRPr lang="en-US" altLang="ko-KR" sz="1200" dirty="0">
+              <a:latin typeface="+mn-ea"/>
+            </a:endParaRPr>
+          </a:p>
+          <a:p>
+            <a:r>
+              <a:rPr lang="en-US" altLang="ko-KR" sz="1200" dirty="0">
+                <a:latin typeface="+mn-ea"/>
+              </a:rPr>
+              <a:t>    image </a:t>
+            </a:r>
+            <a:r>
+              <a:rPr lang="en-US" altLang="ko-KR" sz="1200" dirty="0" err="1">
+                <a:latin typeface="+mn-ea"/>
+              </a:rPr>
+              <a:t>longblob</a:t>
+            </a:r>
+            <a:r>
+              <a:rPr lang="en-US" altLang="ko-KR" sz="1200" dirty="0">
+                <a:latin typeface="+mn-ea"/>
+              </a:rPr>
+              <a:t> not null, </a:t>
+            </a:r>
+          </a:p>
+          <a:p>
+            <a:r>
+              <a:rPr lang="en-US" altLang="ko-KR" sz="1200" dirty="0">
+                <a:latin typeface="+mn-ea"/>
+              </a:rPr>
+              <a:t>    title varchar(255) not null,</a:t>
+            </a:r>
+          </a:p>
+          <a:p>
+            <a:r>
+              <a:rPr lang="en-US" altLang="ko-KR" sz="1200" dirty="0">
+                <a:latin typeface="+mn-ea"/>
+              </a:rPr>
+              <a:t>    </a:t>
+            </a:r>
+            <a:r>
+              <a:rPr lang="en-US" altLang="ko-KR" sz="1200" dirty="0" err="1">
+                <a:latin typeface="+mn-ea"/>
+              </a:rPr>
+              <a:t>relYear</a:t>
+            </a:r>
+            <a:r>
+              <a:rPr lang="en-US" altLang="ko-KR" sz="1200" dirty="0">
+                <a:latin typeface="+mn-ea"/>
+              </a:rPr>
+              <a:t> </a:t>
+            </a:r>
+            <a:r>
+              <a:rPr lang="en-US" altLang="ko-KR" sz="1200" dirty="0" err="1">
+                <a:latin typeface="+mn-ea"/>
+              </a:rPr>
+              <a:t>int</a:t>
+            </a:r>
+            <a:r>
+              <a:rPr lang="en-US" altLang="ko-KR" sz="1200" dirty="0">
+                <a:latin typeface="+mn-ea"/>
+              </a:rPr>
+              <a:t> not null,</a:t>
+            </a:r>
+          </a:p>
+          <a:p>
+            <a:r>
+              <a:rPr lang="en-US" altLang="ko-KR" sz="1200" dirty="0">
+                <a:latin typeface="+mn-ea"/>
+              </a:rPr>
+              <a:t>    rating varchar(20) not null,</a:t>
+            </a:r>
+          </a:p>
+          <a:p>
+            <a:r>
+              <a:rPr lang="en-US" altLang="ko-KR" sz="1200" dirty="0">
+                <a:latin typeface="+mn-ea"/>
+              </a:rPr>
+              <a:t>    </a:t>
+            </a:r>
+            <a:r>
+              <a:rPr lang="en-US" altLang="ko-KR" sz="1200" dirty="0" err="1">
+                <a:latin typeface="+mn-ea"/>
+              </a:rPr>
+              <a:t>runTime</a:t>
+            </a:r>
+            <a:r>
+              <a:rPr lang="en-US" altLang="ko-KR" sz="1200" dirty="0">
+                <a:latin typeface="+mn-ea"/>
+              </a:rPr>
+              <a:t> float not null,</a:t>
+            </a:r>
+          </a:p>
+          <a:p>
+            <a:r>
+              <a:rPr lang="en-US" altLang="ko-KR" sz="1200" dirty="0">
+                <a:latin typeface="+mn-ea"/>
+              </a:rPr>
+              <a:t>    genre varchar(255) not null,</a:t>
+            </a:r>
+          </a:p>
+          <a:p>
+            <a:r>
+              <a:rPr lang="en-US" altLang="ko-KR" sz="1200" dirty="0">
+                <a:latin typeface="+mn-ea"/>
+              </a:rPr>
+              <a:t>    director varchar(255) not null,</a:t>
+            </a:r>
+          </a:p>
+          <a:p>
+            <a:r>
+              <a:rPr lang="en-US" altLang="ko-KR" sz="1200" dirty="0">
+                <a:latin typeface="+mn-ea"/>
+              </a:rPr>
+              <a:t>    story varchar(2000) not null,</a:t>
+            </a:r>
+          </a:p>
+          <a:p>
+            <a:r>
+              <a:rPr lang="en-US" altLang="ko-KR" sz="1200" dirty="0">
+                <a:latin typeface="+mn-ea"/>
+              </a:rPr>
+              <a:t>    actor varchar(255) not null,</a:t>
+            </a:r>
+          </a:p>
+          <a:p>
+            <a:r>
+              <a:rPr lang="en-US" altLang="ko-KR" sz="1200" dirty="0">
+                <a:latin typeface="+mn-ea"/>
+              </a:rPr>
+              <a:t>    prod varchar(255) not null,</a:t>
+            </a:r>
+          </a:p>
+          <a:p>
+            <a:r>
+              <a:rPr lang="en-US" altLang="ko-KR" sz="1200" dirty="0">
+                <a:latin typeface="+mn-ea"/>
+              </a:rPr>
+              <a:t>    nation varchar(255) not null,</a:t>
+            </a:r>
+          </a:p>
+          <a:p>
+            <a:r>
+              <a:rPr lang="en-US" altLang="ko-KR" sz="1200" dirty="0">
+                <a:latin typeface="+mn-ea"/>
+              </a:rPr>
+              <a:t>    </a:t>
+            </a:r>
+            <a:r>
+              <a:rPr lang="en-US" altLang="ko-KR" sz="1200" dirty="0" err="1">
+                <a:latin typeface="+mn-ea"/>
+              </a:rPr>
+              <a:t>etc</a:t>
+            </a:r>
+            <a:r>
+              <a:rPr lang="en-US" altLang="ko-KR" sz="1200" dirty="0">
+                <a:latin typeface="+mn-ea"/>
+              </a:rPr>
+              <a:t> varchar(255)</a:t>
+            </a:r>
+          </a:p>
+          <a:p>
+            <a:r>
+              <a:rPr lang="en-US" altLang="ko-KR" sz="1200" dirty="0">
+                <a:latin typeface="+mn-ea"/>
+              </a:rPr>
+              <a:t>);</a:t>
+            </a:r>
+          </a:p>
+          <a:p>
+            <a:endParaRPr lang="en-US" altLang="ko-KR" sz="1200" dirty="0">
+              <a:latin typeface="+mn-ea"/>
+            </a:endParaRPr>
+          </a:p>
+        </p:txBody>
+      </p:sp>
+    </p:spTree>
+    <p:extLst>
+      <p:ext uri="{BB962C8B-B14F-4D97-AF65-F5344CB8AC3E}">
+        <p14:creationId xmlns:p14="http://schemas.microsoft.com/office/powerpoint/2010/main" val="2165939787"/>
       </p:ext>
     </p:extLst>
   </p:cSld>

</xml_diff>